<commit_message>
First Pass all the slides are there.
</commit_message>
<xml_diff>
--- a/Trunk/Getting Started Material/DCAF Training/5 Module Reuse.pptx
+++ b/Trunk/Getting Started Material/DCAF Training/5 Module Reuse.pptx
@@ -5,15 +5,27 @@
     <p:sldMasterId id="2147483660" r:id="rId1"/>
   </p:sldMasterIdLst>
   <p:notesMasterIdLst>
-    <p:notesMasterId r:id="rId8"/>
+    <p:notesMasterId r:id="rId20"/>
   </p:notesMasterIdLst>
   <p:sldIdLst>
     <p:sldId id="256" r:id="rId2"/>
-    <p:sldId id="257" r:id="rId3"/>
-    <p:sldId id="324" r:id="rId4"/>
-    <p:sldId id="322" r:id="rId5"/>
-    <p:sldId id="293" r:id="rId6"/>
-    <p:sldId id="323" r:id="rId7"/>
+    <p:sldId id="331" r:id="rId3"/>
+    <p:sldId id="257" r:id="rId4"/>
+    <p:sldId id="324" r:id="rId5"/>
+    <p:sldId id="325" r:id="rId6"/>
+    <p:sldId id="326" r:id="rId7"/>
+    <p:sldId id="327" r:id="rId8"/>
+    <p:sldId id="328" r:id="rId9"/>
+    <p:sldId id="329" r:id="rId10"/>
+    <p:sldId id="330" r:id="rId11"/>
+    <p:sldId id="333" r:id="rId12"/>
+    <p:sldId id="334" r:id="rId13"/>
+    <p:sldId id="335" r:id="rId14"/>
+    <p:sldId id="336" r:id="rId15"/>
+    <p:sldId id="332" r:id="rId16"/>
+    <p:sldId id="337" r:id="rId17"/>
+    <p:sldId id="338" r:id="rId18"/>
+    <p:sldId id="339" r:id="rId19"/>
   </p:sldIdLst>
   <p:sldSz cx="12192000" cy="6858000"/>
   <p:notesSz cx="6858000" cy="9144000"/>
@@ -537,7 +549,7 @@
           <a:p>
             <a:fld id="{7D9CDBD8-7FFA-4F3F-BD4F-ADCB5A009586}" type="slidenum">
               <a:rPr lang="en-US" smtClean="0"/>
-              <a:t>2</a:t>
+              <a:t>3</a:t>
             </a:fld>
             <a:endParaRPr lang="en-US"/>
           </a:p>
@@ -547,6 +559,209 @@
     <p:extLst>
       <p:ext uri="{BB962C8B-B14F-4D97-AF65-F5344CB8AC3E}">
         <p14:creationId xmlns:p14="http://schemas.microsoft.com/office/powerpoint/2010/main" val="2288441605"/>
+      </p:ext>
+    </p:extLst>
+  </p:cSld>
+  <p:clrMapOvr>
+    <a:masterClrMapping/>
+  </p:clrMapOvr>
+</p:notes>
+</file>
+
+<file path=ppt/notesSlides/notesSlide2.xml><?xml version="1.0" encoding="utf-8"?>
+<p:notes xmlns:a="http://schemas.openxmlformats.org/drawingml/2006/main" xmlns:r="http://schemas.openxmlformats.org/officeDocument/2006/relationships" xmlns:p="http://schemas.openxmlformats.org/presentationml/2006/main">
+  <p:cSld>
+    <p:spTree>
+      <p:nvGrpSpPr>
+        <p:cNvPr id="1" name=""/>
+        <p:cNvGrpSpPr/>
+        <p:nvPr/>
+      </p:nvGrpSpPr>
+      <p:grpSpPr>
+        <a:xfrm>
+          <a:off x="0" y="0"/>
+          <a:ext cx="0" cy="0"/>
+          <a:chOff x="0" y="0"/>
+          <a:chExt cx="0" cy="0"/>
+        </a:xfrm>
+      </p:grpSpPr>
+      <p:sp>
+        <p:nvSpPr>
+          <p:cNvPr id="2" name="Slide Image Placeholder 1"/>
+          <p:cNvSpPr>
+            <a:spLocks noGrp="1" noRot="1" noChangeAspect="1"/>
+          </p:cNvSpPr>
+          <p:nvPr>
+            <p:ph type="sldImg"/>
+          </p:nvPr>
+        </p:nvSpPr>
+        <p:spPr/>
+      </p:sp>
+      <p:sp>
+        <p:nvSpPr>
+          <p:cNvPr id="3" name="Notes Placeholder 2"/>
+          <p:cNvSpPr>
+            <a:spLocks noGrp="1"/>
+          </p:cNvSpPr>
+          <p:nvPr>
+            <p:ph type="body" idx="1"/>
+          </p:nvPr>
+        </p:nvSpPr>
+        <p:spPr/>
+        <p:txBody>
+          <a:bodyPr/>
+          <a:lstStyle/>
+          <a:p>
+            <a:r>
+              <a:rPr lang="en-US" dirty="0"/>
+              <a:t>Provide UI</a:t>
+            </a:r>
+          </a:p>
+          <a:p>
+            <a:endParaRPr lang="en-US" dirty="0"/>
+          </a:p>
+        </p:txBody>
+      </p:sp>
+      <p:sp>
+        <p:nvSpPr>
+          <p:cNvPr id="4" name="Slide Number Placeholder 3"/>
+          <p:cNvSpPr>
+            <a:spLocks noGrp="1"/>
+          </p:cNvSpPr>
+          <p:nvPr>
+            <p:ph type="sldNum" sz="quarter" idx="10"/>
+          </p:nvPr>
+        </p:nvSpPr>
+        <p:spPr/>
+        <p:txBody>
+          <a:bodyPr/>
+          <a:lstStyle/>
+          <a:p>
+            <a:fld id="{7D9CDBD8-7FFA-4F3F-BD4F-ADCB5A009586}" type="slidenum">
+              <a:rPr lang="en-US" smtClean="0"/>
+              <a:t>4</a:t>
+            </a:fld>
+            <a:endParaRPr lang="en-US"/>
+          </a:p>
+        </p:txBody>
+      </p:sp>
+    </p:spTree>
+    <p:extLst>
+      <p:ext uri="{BB962C8B-B14F-4D97-AF65-F5344CB8AC3E}">
+        <p14:creationId xmlns:p14="http://schemas.microsoft.com/office/powerpoint/2010/main" val="971296394"/>
+      </p:ext>
+    </p:extLst>
+  </p:cSld>
+  <p:clrMapOvr>
+    <a:masterClrMapping/>
+  </p:clrMapOvr>
+</p:notes>
+</file>
+
+<file path=ppt/notesSlides/notesSlide3.xml><?xml version="1.0" encoding="utf-8"?>
+<p:notes xmlns:a="http://schemas.openxmlformats.org/drawingml/2006/main" xmlns:r="http://schemas.openxmlformats.org/officeDocument/2006/relationships" xmlns:p="http://schemas.openxmlformats.org/presentationml/2006/main">
+  <p:cSld>
+    <p:spTree>
+      <p:nvGrpSpPr>
+        <p:cNvPr id="1" name=""/>
+        <p:cNvGrpSpPr/>
+        <p:nvPr/>
+      </p:nvGrpSpPr>
+      <p:grpSpPr>
+        <a:xfrm>
+          <a:off x="0" y="0"/>
+          <a:ext cx="0" cy="0"/>
+          <a:chOff x="0" y="0"/>
+          <a:chExt cx="0" cy="0"/>
+        </a:xfrm>
+      </p:grpSpPr>
+      <p:sp>
+        <p:nvSpPr>
+          <p:cNvPr id="2" name="Slide Image Placeholder 1"/>
+          <p:cNvSpPr>
+            <a:spLocks noGrp="1" noRot="1" noChangeAspect="1"/>
+          </p:cNvSpPr>
+          <p:nvPr>
+            <p:ph type="sldImg"/>
+          </p:nvPr>
+        </p:nvSpPr>
+        <p:spPr/>
+      </p:sp>
+      <p:sp>
+        <p:nvSpPr>
+          <p:cNvPr id="3" name="Notes Placeholder 2"/>
+          <p:cNvSpPr>
+            <a:spLocks noGrp="1"/>
+          </p:cNvSpPr>
+          <p:nvPr>
+            <p:ph type="body" idx="1"/>
+          </p:nvPr>
+        </p:nvSpPr>
+        <p:spPr/>
+        <p:txBody>
+          <a:bodyPr/>
+          <a:lstStyle/>
+          <a:p>
+            <a:pPr marL="0" marR="0" lvl="0" indent="0" algn="l" defTabSz="914400" rtl="0" eaLnBrk="1" fontAlgn="auto" latinLnBrk="0" hangingPunct="1">
+              <a:lnSpc>
+                <a:spcPct val="100000"/>
+              </a:lnSpc>
+              <a:spcBef>
+                <a:spcPts val="0"/>
+              </a:spcBef>
+              <a:spcAft>
+                <a:spcPts val="0"/>
+              </a:spcAft>
+              <a:buClrTx/>
+              <a:buSzTx/>
+              <a:buFontTx/>
+              <a:buNone/>
+              <a:tabLst/>
+              <a:defRPr/>
+            </a:pPr>
+            <a:r>
+              <a:rPr lang="en-US" dirty="0">
+                <a:hlinkClick r:id="rId3"/>
+              </a:rPr>
+              <a:t>http://www.ni.co</a:t>
+            </a:r>
+            <a:r>
+              <a:rPr lang="en-US" dirty="0"/>
+              <a:t>m/product-documentation/54344/en/</a:t>
+            </a:r>
+          </a:p>
+          <a:p>
+            <a:endParaRPr lang="en-US" dirty="0"/>
+          </a:p>
+        </p:txBody>
+      </p:sp>
+      <p:sp>
+        <p:nvSpPr>
+          <p:cNvPr id="4" name="Slide Number Placeholder 3"/>
+          <p:cNvSpPr>
+            <a:spLocks noGrp="1"/>
+          </p:cNvSpPr>
+          <p:nvPr>
+            <p:ph type="sldNum" sz="quarter" idx="10"/>
+          </p:nvPr>
+        </p:nvSpPr>
+        <p:spPr/>
+        <p:txBody>
+          <a:bodyPr/>
+          <a:lstStyle/>
+          <a:p>
+            <a:fld id="{7D9CDBD8-7FFA-4F3F-BD4F-ADCB5A009586}" type="slidenum">
+              <a:rPr lang="en-US" smtClean="0"/>
+              <a:t>11</a:t>
+            </a:fld>
+            <a:endParaRPr lang="en-US"/>
+          </a:p>
+        </p:txBody>
+      </p:sp>
+    </p:spTree>
+    <p:extLst>
+      <p:ext uri="{BB962C8B-B14F-4D97-AF65-F5344CB8AC3E}">
+        <p14:creationId xmlns:p14="http://schemas.microsoft.com/office/powerpoint/2010/main" val="2921454954"/>
       </p:ext>
     </p:extLst>
   </p:cSld>
@@ -7662,6 +7877,832 @@
 </p:sld>
 </file>
 
+<file path=ppt/slides/slide10.xml><?xml version="1.0" encoding="utf-8"?>
+<p:sld xmlns:a="http://schemas.openxmlformats.org/drawingml/2006/main" xmlns:r="http://schemas.openxmlformats.org/officeDocument/2006/relationships" xmlns:p="http://schemas.openxmlformats.org/presentationml/2006/main">
+  <p:cSld>
+    <p:spTree>
+      <p:nvGrpSpPr>
+        <p:cNvPr id="1" name=""/>
+        <p:cNvGrpSpPr/>
+        <p:nvPr/>
+      </p:nvGrpSpPr>
+      <p:grpSpPr>
+        <a:xfrm>
+          <a:off x="0" y="0"/>
+          <a:ext cx="0" cy="0"/>
+          <a:chOff x="0" y="0"/>
+          <a:chExt cx="0" cy="0"/>
+        </a:xfrm>
+      </p:grpSpPr>
+      <p:sp>
+        <p:nvSpPr>
+          <p:cNvPr id="4" name="Text Placeholder 3">
+            <a:extLst>
+              <a:ext uri="{FF2B5EF4-FFF2-40B4-BE49-F238E27FC236}">
+                <a16:creationId xmlns:a16="http://schemas.microsoft.com/office/drawing/2014/main" id="{8E74E8A2-5E75-4DD9-82DB-05972278D9D6}"/>
+              </a:ext>
+            </a:extLst>
+          </p:cNvPr>
+          <p:cNvSpPr>
+            <a:spLocks noGrp="1"/>
+          </p:cNvSpPr>
+          <p:nvPr>
+            <p:ph type="body" sz="quarter" idx="10"/>
+          </p:nvPr>
+        </p:nvSpPr>
+        <p:spPr/>
+        <p:txBody>
+          <a:bodyPr/>
+          <a:lstStyle/>
+          <a:p>
+            <a:r>
+              <a:rPr lang="en-US" dirty="0"/>
+              <a:t>Exercise 1</a:t>
+            </a:r>
+          </a:p>
+        </p:txBody>
+      </p:sp>
+    </p:spTree>
+    <p:extLst>
+      <p:ext uri="{BB962C8B-B14F-4D97-AF65-F5344CB8AC3E}">
+        <p14:creationId xmlns:p14="http://schemas.microsoft.com/office/powerpoint/2010/main" val="3349141731"/>
+      </p:ext>
+    </p:extLst>
+  </p:cSld>
+  <p:clrMapOvr>
+    <a:masterClrMapping/>
+  </p:clrMapOvr>
+</p:sld>
+</file>
+
+<file path=ppt/slides/slide11.xml><?xml version="1.0" encoding="utf-8"?>
+<p:sld xmlns:a="http://schemas.openxmlformats.org/drawingml/2006/main" xmlns:r="http://schemas.openxmlformats.org/officeDocument/2006/relationships" xmlns:p="http://schemas.openxmlformats.org/presentationml/2006/main">
+  <p:cSld>
+    <p:spTree>
+      <p:nvGrpSpPr>
+        <p:cNvPr id="1" name=""/>
+        <p:cNvGrpSpPr/>
+        <p:nvPr/>
+      </p:nvGrpSpPr>
+      <p:grpSpPr>
+        <a:xfrm>
+          <a:off x="0" y="0"/>
+          <a:ext cx="0" cy="0"/>
+          <a:chOff x="0" y="0"/>
+          <a:chExt cx="0" cy="0"/>
+        </a:xfrm>
+      </p:grpSpPr>
+      <p:sp>
+        <p:nvSpPr>
+          <p:cNvPr id="2" name="Title 1">
+            <a:extLst>
+              <a:ext uri="{FF2B5EF4-FFF2-40B4-BE49-F238E27FC236}">
+                <a16:creationId xmlns:a16="http://schemas.microsoft.com/office/drawing/2014/main" id="{56983C6A-A7F6-45A6-AAEF-BEC616303276}"/>
+              </a:ext>
+            </a:extLst>
+          </p:cNvPr>
+          <p:cNvSpPr>
+            <a:spLocks noGrp="1"/>
+          </p:cNvSpPr>
+          <p:nvPr>
+            <p:ph type="title"/>
+          </p:nvPr>
+        </p:nvSpPr>
+        <p:spPr/>
+        <p:txBody>
+          <a:bodyPr/>
+          <a:lstStyle/>
+          <a:p>
+            <a:r>
+              <a:rPr lang="en-US" dirty="0"/>
+              <a:t>Available DCAF Module</a:t>
+            </a:r>
+          </a:p>
+        </p:txBody>
+      </p:sp>
+      <p:pic>
+        <p:nvPicPr>
+          <p:cNvPr id="5" name="Content Placeholder 4">
+            <a:extLst>
+              <a:ext uri="{FF2B5EF4-FFF2-40B4-BE49-F238E27FC236}">
+                <a16:creationId xmlns:a16="http://schemas.microsoft.com/office/drawing/2014/main" id="{A90A4382-11DE-466F-B2EB-C93F26ADCDD3}"/>
+              </a:ext>
+            </a:extLst>
+          </p:cNvPr>
+          <p:cNvPicPr>
+            <a:picLocks noGrp="1" noChangeAspect="1"/>
+          </p:cNvPicPr>
+          <p:nvPr>
+            <p:ph idx="1"/>
+          </p:nvPr>
+        </p:nvPicPr>
+        <p:blipFill>
+          <a:blip r:embed="rId3"/>
+          <a:stretch>
+            <a:fillRect/>
+          </a:stretch>
+        </p:blipFill>
+        <p:spPr>
+          <a:xfrm>
+            <a:off x="2635362" y="974725"/>
+            <a:ext cx="6911751" cy="4897438"/>
+          </a:xfrm>
+          <a:prstGeom prst="rect">
+            <a:avLst/>
+          </a:prstGeom>
+        </p:spPr>
+      </p:pic>
+    </p:spTree>
+    <p:extLst>
+      <p:ext uri="{BB962C8B-B14F-4D97-AF65-F5344CB8AC3E}">
+        <p14:creationId xmlns:p14="http://schemas.microsoft.com/office/powerpoint/2010/main" val="75117760"/>
+      </p:ext>
+    </p:extLst>
+  </p:cSld>
+  <p:clrMapOvr>
+    <a:masterClrMapping/>
+  </p:clrMapOvr>
+</p:sld>
+</file>
+
+<file path=ppt/slides/slide12.xml><?xml version="1.0" encoding="utf-8"?>
+<p:sld xmlns:a="http://schemas.openxmlformats.org/drawingml/2006/main" xmlns:r="http://schemas.openxmlformats.org/officeDocument/2006/relationships" xmlns:p="http://schemas.openxmlformats.org/presentationml/2006/main">
+  <p:cSld>
+    <p:spTree>
+      <p:nvGrpSpPr>
+        <p:cNvPr id="1" name=""/>
+        <p:cNvGrpSpPr/>
+        <p:nvPr/>
+      </p:nvGrpSpPr>
+      <p:grpSpPr>
+        <a:xfrm>
+          <a:off x="0" y="0"/>
+          <a:ext cx="0" cy="0"/>
+          <a:chOff x="0" y="0"/>
+          <a:chExt cx="0" cy="0"/>
+        </a:xfrm>
+      </p:grpSpPr>
+      <p:sp>
+        <p:nvSpPr>
+          <p:cNvPr id="2" name="Title 1">
+            <a:extLst>
+              <a:ext uri="{FF2B5EF4-FFF2-40B4-BE49-F238E27FC236}">
+                <a16:creationId xmlns:a16="http://schemas.microsoft.com/office/drawing/2014/main" id="{B85EB323-3F30-45A2-BAA5-D5373A4BC1FD}"/>
+              </a:ext>
+            </a:extLst>
+          </p:cNvPr>
+          <p:cNvSpPr>
+            <a:spLocks noGrp="1"/>
+          </p:cNvSpPr>
+          <p:nvPr>
+            <p:ph type="title"/>
+          </p:nvPr>
+        </p:nvSpPr>
+        <p:spPr/>
+        <p:txBody>
+          <a:bodyPr/>
+          <a:lstStyle/>
+          <a:p>
+            <a:r>
+              <a:rPr lang="en-US" dirty="0"/>
+              <a:t>Available DCAF Module</a:t>
+            </a:r>
+          </a:p>
+        </p:txBody>
+      </p:sp>
+      <p:pic>
+        <p:nvPicPr>
+          <p:cNvPr id="4" name="Content Placeholder 3">
+            <a:extLst>
+              <a:ext uri="{FF2B5EF4-FFF2-40B4-BE49-F238E27FC236}">
+                <a16:creationId xmlns:a16="http://schemas.microsoft.com/office/drawing/2014/main" id="{B4552DF6-6307-4684-998B-97A46FD1F4CB}"/>
+              </a:ext>
+            </a:extLst>
+          </p:cNvPr>
+          <p:cNvPicPr>
+            <a:picLocks noGrp="1" noChangeAspect="1"/>
+          </p:cNvPicPr>
+          <p:nvPr>
+            <p:ph idx="1"/>
+          </p:nvPr>
+        </p:nvPicPr>
+        <p:blipFill>
+          <a:blip r:embed="rId2"/>
+          <a:stretch>
+            <a:fillRect/>
+          </a:stretch>
+        </p:blipFill>
+        <p:spPr>
+          <a:xfrm>
+            <a:off x="2673415" y="974725"/>
+            <a:ext cx="6835646" cy="4897438"/>
+          </a:xfrm>
+          <a:prstGeom prst="rect">
+            <a:avLst/>
+          </a:prstGeom>
+        </p:spPr>
+      </p:pic>
+    </p:spTree>
+    <p:extLst>
+      <p:ext uri="{BB962C8B-B14F-4D97-AF65-F5344CB8AC3E}">
+        <p14:creationId xmlns:p14="http://schemas.microsoft.com/office/powerpoint/2010/main" val="3539825084"/>
+      </p:ext>
+    </p:extLst>
+  </p:cSld>
+  <p:clrMapOvr>
+    <a:masterClrMapping/>
+  </p:clrMapOvr>
+</p:sld>
+</file>
+
+<file path=ppt/slides/slide13.xml><?xml version="1.0" encoding="utf-8"?>
+<p:sld xmlns:a="http://schemas.openxmlformats.org/drawingml/2006/main" xmlns:r="http://schemas.openxmlformats.org/officeDocument/2006/relationships" xmlns:p="http://schemas.openxmlformats.org/presentationml/2006/main">
+  <p:cSld>
+    <p:spTree>
+      <p:nvGrpSpPr>
+        <p:cNvPr id="1" name=""/>
+        <p:cNvGrpSpPr/>
+        <p:nvPr/>
+      </p:nvGrpSpPr>
+      <p:grpSpPr>
+        <a:xfrm>
+          <a:off x="0" y="0"/>
+          <a:ext cx="0" cy="0"/>
+          <a:chOff x="0" y="0"/>
+          <a:chExt cx="0" cy="0"/>
+        </a:xfrm>
+      </p:grpSpPr>
+      <p:sp>
+        <p:nvSpPr>
+          <p:cNvPr id="2" name="Title 1">
+            <a:extLst>
+              <a:ext uri="{FF2B5EF4-FFF2-40B4-BE49-F238E27FC236}">
+                <a16:creationId xmlns:a16="http://schemas.microsoft.com/office/drawing/2014/main" id="{03DD24FA-C02D-4EBE-9FCE-BCAD3C7D0235}"/>
+              </a:ext>
+            </a:extLst>
+          </p:cNvPr>
+          <p:cNvSpPr>
+            <a:spLocks noGrp="1"/>
+          </p:cNvSpPr>
+          <p:nvPr>
+            <p:ph type="title"/>
+          </p:nvPr>
+        </p:nvSpPr>
+        <p:spPr/>
+        <p:txBody>
+          <a:bodyPr/>
+          <a:lstStyle/>
+          <a:p>
+            <a:r>
+              <a:rPr lang="en-US" dirty="0"/>
+              <a:t>Search Paths</a:t>
+            </a:r>
+          </a:p>
+        </p:txBody>
+      </p:sp>
+      <p:pic>
+        <p:nvPicPr>
+          <p:cNvPr id="4" name="Content Placeholder 3">
+            <a:extLst>
+              <a:ext uri="{FF2B5EF4-FFF2-40B4-BE49-F238E27FC236}">
+                <a16:creationId xmlns:a16="http://schemas.microsoft.com/office/drawing/2014/main" id="{585A6CD5-57ED-4614-8357-60C3C9A1F854}"/>
+              </a:ext>
+            </a:extLst>
+          </p:cNvPr>
+          <p:cNvPicPr>
+            <a:picLocks noGrp="1" noChangeAspect="1"/>
+          </p:cNvPicPr>
+          <p:nvPr>
+            <p:ph idx="1"/>
+          </p:nvPr>
+        </p:nvPicPr>
+        <p:blipFill>
+          <a:blip r:embed="rId2"/>
+          <a:stretch>
+            <a:fillRect/>
+          </a:stretch>
+        </p:blipFill>
+        <p:spPr>
+          <a:xfrm>
+            <a:off x="1385341" y="974725"/>
+            <a:ext cx="9411794" cy="4897438"/>
+          </a:xfrm>
+          <a:prstGeom prst="rect">
+            <a:avLst/>
+          </a:prstGeom>
+        </p:spPr>
+      </p:pic>
+    </p:spTree>
+    <p:extLst>
+      <p:ext uri="{BB962C8B-B14F-4D97-AF65-F5344CB8AC3E}">
+        <p14:creationId xmlns:p14="http://schemas.microsoft.com/office/powerpoint/2010/main" val="2054263143"/>
+      </p:ext>
+    </p:extLst>
+  </p:cSld>
+  <p:clrMapOvr>
+    <a:masterClrMapping/>
+  </p:clrMapOvr>
+</p:sld>
+</file>
+
+<file path=ppt/slides/slide14.xml><?xml version="1.0" encoding="utf-8"?>
+<p:sld xmlns:a="http://schemas.openxmlformats.org/drawingml/2006/main" xmlns:r="http://schemas.openxmlformats.org/officeDocument/2006/relationships" xmlns:p="http://schemas.openxmlformats.org/presentationml/2006/main">
+  <p:cSld>
+    <p:spTree>
+      <p:nvGrpSpPr>
+        <p:cNvPr id="1" name=""/>
+        <p:cNvGrpSpPr/>
+        <p:nvPr/>
+      </p:nvGrpSpPr>
+      <p:grpSpPr>
+        <a:xfrm>
+          <a:off x="0" y="0"/>
+          <a:ext cx="0" cy="0"/>
+          <a:chOff x="0" y="0"/>
+          <a:chExt cx="0" cy="0"/>
+        </a:xfrm>
+      </p:grpSpPr>
+      <p:sp>
+        <p:nvSpPr>
+          <p:cNvPr id="4" name="Text Placeholder 3">
+            <a:extLst>
+              <a:ext uri="{FF2B5EF4-FFF2-40B4-BE49-F238E27FC236}">
+                <a16:creationId xmlns:a16="http://schemas.microsoft.com/office/drawing/2014/main" id="{8E74E8A2-5E75-4DD9-82DB-05972278D9D6}"/>
+              </a:ext>
+            </a:extLst>
+          </p:cNvPr>
+          <p:cNvSpPr>
+            <a:spLocks noGrp="1"/>
+          </p:cNvSpPr>
+          <p:nvPr>
+            <p:ph type="body" sz="quarter" idx="10"/>
+          </p:nvPr>
+        </p:nvSpPr>
+        <p:spPr/>
+        <p:txBody>
+          <a:bodyPr/>
+          <a:lstStyle/>
+          <a:p>
+            <a:r>
+              <a:rPr lang="en-US" dirty="0"/>
+              <a:t>Exercise 2</a:t>
+            </a:r>
+          </a:p>
+        </p:txBody>
+      </p:sp>
+    </p:spTree>
+    <p:extLst>
+      <p:ext uri="{BB962C8B-B14F-4D97-AF65-F5344CB8AC3E}">
+        <p14:creationId xmlns:p14="http://schemas.microsoft.com/office/powerpoint/2010/main" val="2557804420"/>
+      </p:ext>
+    </p:extLst>
+  </p:cSld>
+  <p:clrMapOvr>
+    <a:masterClrMapping/>
+  </p:clrMapOvr>
+</p:sld>
+</file>
+
+<file path=ppt/slides/slide15.xml><?xml version="1.0" encoding="utf-8"?>
+<p:sld xmlns:a="http://schemas.openxmlformats.org/drawingml/2006/main" xmlns:r="http://schemas.openxmlformats.org/officeDocument/2006/relationships" xmlns:p="http://schemas.openxmlformats.org/presentationml/2006/main">
+  <p:cSld>
+    <p:spTree>
+      <p:nvGrpSpPr>
+        <p:cNvPr id="1" name=""/>
+        <p:cNvGrpSpPr/>
+        <p:nvPr/>
+      </p:nvGrpSpPr>
+      <p:grpSpPr>
+        <a:xfrm>
+          <a:off x="0" y="0"/>
+          <a:ext cx="0" cy="0"/>
+          <a:chOff x="0" y="0"/>
+          <a:chExt cx="0" cy="0"/>
+        </a:xfrm>
+      </p:grpSpPr>
+      <p:sp>
+        <p:nvSpPr>
+          <p:cNvPr id="2" name="Title 1"/>
+          <p:cNvSpPr>
+            <a:spLocks noGrp="1"/>
+          </p:cNvSpPr>
+          <p:nvPr>
+            <p:ph type="title"/>
+          </p:nvPr>
+        </p:nvSpPr>
+        <p:spPr/>
+        <p:txBody>
+          <a:bodyPr/>
+          <a:lstStyle/>
+          <a:p>
+            <a:r>
+              <a:rPr lang="en-US" dirty="0"/>
+              <a:t> What type of module do I need</a:t>
+            </a:r>
+          </a:p>
+        </p:txBody>
+      </p:sp>
+      <p:sp>
+        <p:nvSpPr>
+          <p:cNvPr id="3" name="Content Placeholder 2"/>
+          <p:cNvSpPr>
+            <a:spLocks noGrp="1"/>
+          </p:cNvSpPr>
+          <p:nvPr>
+            <p:ph idx="1"/>
+          </p:nvPr>
+        </p:nvSpPr>
+        <p:spPr/>
+        <p:txBody>
+          <a:bodyPr/>
+          <a:lstStyle/>
+          <a:p>
+            <a:endParaRPr lang="en-US" dirty="0"/>
+          </a:p>
+          <a:p>
+            <a:endParaRPr lang="en-US" dirty="0"/>
+          </a:p>
+        </p:txBody>
+      </p:sp>
+      <p:pic>
+        <p:nvPicPr>
+          <p:cNvPr id="6" name="Picture 5">
+            <a:extLst>
+              <a:ext uri="{FF2B5EF4-FFF2-40B4-BE49-F238E27FC236}">
+                <a16:creationId xmlns:a16="http://schemas.microsoft.com/office/drawing/2014/main" id="{020D13B5-AA7C-40F4-804E-4430A96880F4}"/>
+              </a:ext>
+            </a:extLst>
+          </p:cNvPr>
+          <p:cNvPicPr>
+            <a:picLocks noChangeAspect="1"/>
+          </p:cNvPicPr>
+          <p:nvPr/>
+        </p:nvPicPr>
+        <p:blipFill>
+          <a:blip r:embed="rId2"/>
+          <a:stretch>
+            <a:fillRect/>
+          </a:stretch>
+        </p:blipFill>
+        <p:spPr>
+          <a:xfrm>
+            <a:off x="1113453" y="1158632"/>
+            <a:ext cx="9558780" cy="4996462"/>
+          </a:xfrm>
+          <a:prstGeom prst="rect">
+            <a:avLst/>
+          </a:prstGeom>
+        </p:spPr>
+      </p:pic>
+    </p:spTree>
+    <p:extLst>
+      <p:ext uri="{BB962C8B-B14F-4D97-AF65-F5344CB8AC3E}">
+        <p14:creationId xmlns:p14="http://schemas.microsoft.com/office/powerpoint/2010/main" val="1652348957"/>
+      </p:ext>
+    </p:extLst>
+  </p:cSld>
+  <p:clrMapOvr>
+    <a:masterClrMapping/>
+  </p:clrMapOvr>
+</p:sld>
+</file>
+
+<file path=ppt/slides/slide16.xml><?xml version="1.0" encoding="utf-8"?>
+<p:sld xmlns:a="http://schemas.openxmlformats.org/drawingml/2006/main" xmlns:r="http://schemas.openxmlformats.org/officeDocument/2006/relationships" xmlns:p="http://schemas.openxmlformats.org/presentationml/2006/main">
+  <p:cSld>
+    <p:spTree>
+      <p:nvGrpSpPr>
+        <p:cNvPr id="1" name=""/>
+        <p:cNvGrpSpPr/>
+        <p:nvPr/>
+      </p:nvGrpSpPr>
+      <p:grpSpPr>
+        <a:xfrm>
+          <a:off x="0" y="0"/>
+          <a:ext cx="0" cy="0"/>
+          <a:chOff x="0" y="0"/>
+          <a:chExt cx="0" cy="0"/>
+        </a:xfrm>
+      </p:grpSpPr>
+      <p:sp>
+        <p:nvSpPr>
+          <p:cNvPr id="2" name="Title 1">
+            <a:extLst>
+              <a:ext uri="{FF2B5EF4-FFF2-40B4-BE49-F238E27FC236}">
+                <a16:creationId xmlns:a16="http://schemas.microsoft.com/office/drawing/2014/main" id="{E2FFB8DF-E381-441C-AB33-0AB0CD6CDD29}"/>
+              </a:ext>
+            </a:extLst>
+          </p:cNvPr>
+          <p:cNvSpPr>
+            <a:spLocks noGrp="1"/>
+          </p:cNvSpPr>
+          <p:nvPr>
+            <p:ph type="title"/>
+          </p:nvPr>
+        </p:nvSpPr>
+        <p:spPr/>
+        <p:txBody>
+          <a:bodyPr/>
+          <a:lstStyle/>
+          <a:p>
+            <a:r>
+              <a:rPr lang="en-US" dirty="0"/>
+              <a:t>Script Includes</a:t>
+            </a:r>
+          </a:p>
+        </p:txBody>
+      </p:sp>
+      <p:sp>
+        <p:nvSpPr>
+          <p:cNvPr id="3" name="Content Placeholder 2">
+            <a:extLst>
+              <a:ext uri="{FF2B5EF4-FFF2-40B4-BE49-F238E27FC236}">
+                <a16:creationId xmlns:a16="http://schemas.microsoft.com/office/drawing/2014/main" id="{5DD0D945-60E8-43F2-BE43-384B4E3DCB56}"/>
+              </a:ext>
+            </a:extLst>
+          </p:cNvPr>
+          <p:cNvSpPr>
+            <a:spLocks noGrp="1"/>
+          </p:cNvSpPr>
+          <p:nvPr>
+            <p:ph idx="1"/>
+          </p:nvPr>
+        </p:nvSpPr>
+        <p:spPr/>
+        <p:txBody>
+          <a:bodyPr/>
+          <a:lstStyle/>
+          <a:p>
+            <a:r>
+              <a:rPr lang="en-US" dirty="0"/>
+              <a:t>You should run this every time you add new modules to the configuration</a:t>
+            </a:r>
+          </a:p>
+          <a:p>
+            <a:r>
+              <a:rPr lang="en-US" dirty="0"/>
+              <a:t>It updates the includes VI</a:t>
+            </a:r>
+          </a:p>
+        </p:txBody>
+      </p:sp>
+      <p:pic>
+        <p:nvPicPr>
+          <p:cNvPr id="6" name="Picture Placeholder 5">
+            <a:extLst>
+              <a:ext uri="{FF2B5EF4-FFF2-40B4-BE49-F238E27FC236}">
+                <a16:creationId xmlns:a16="http://schemas.microsoft.com/office/drawing/2014/main" id="{03268D42-02C0-4EB4-93DB-F2491F854F54}"/>
+              </a:ext>
+            </a:extLst>
+          </p:cNvPr>
+          <p:cNvPicPr>
+            <a:picLocks noGrp="1" noChangeAspect="1"/>
+          </p:cNvPicPr>
+          <p:nvPr>
+            <p:ph type="pic" sz="quarter" idx="10"/>
+          </p:nvPr>
+        </p:nvPicPr>
+        <p:blipFill>
+          <a:blip r:embed="rId2"/>
+          <a:srcRect l="3936" r="3936"/>
+          <a:stretch>
+            <a:fillRect/>
+          </a:stretch>
+        </p:blipFill>
+        <p:spPr>
+          <a:prstGeom prst="rect">
+            <a:avLst/>
+          </a:prstGeom>
+        </p:spPr>
+      </p:pic>
+    </p:spTree>
+    <p:extLst>
+      <p:ext uri="{BB962C8B-B14F-4D97-AF65-F5344CB8AC3E}">
+        <p14:creationId xmlns:p14="http://schemas.microsoft.com/office/powerpoint/2010/main" val="3075195045"/>
+      </p:ext>
+    </p:extLst>
+  </p:cSld>
+  <p:clrMapOvr>
+    <a:masterClrMapping/>
+  </p:clrMapOvr>
+</p:sld>
+</file>
+
+<file path=ppt/slides/slide17.xml><?xml version="1.0" encoding="utf-8"?>
+<p:sld xmlns:a="http://schemas.openxmlformats.org/drawingml/2006/main" xmlns:r="http://schemas.openxmlformats.org/officeDocument/2006/relationships" xmlns:p="http://schemas.openxmlformats.org/presentationml/2006/main">
+  <p:cSld>
+    <p:spTree>
+      <p:nvGrpSpPr>
+        <p:cNvPr id="1" name=""/>
+        <p:cNvGrpSpPr/>
+        <p:nvPr/>
+      </p:nvGrpSpPr>
+      <p:grpSpPr>
+        <a:xfrm>
+          <a:off x="0" y="0"/>
+          <a:ext cx="0" cy="0"/>
+          <a:chOff x="0" y="0"/>
+          <a:chExt cx="0" cy="0"/>
+        </a:xfrm>
+      </p:grpSpPr>
+      <p:sp>
+        <p:nvSpPr>
+          <p:cNvPr id="2" name="Title 1">
+            <a:extLst>
+              <a:ext uri="{FF2B5EF4-FFF2-40B4-BE49-F238E27FC236}">
+                <a16:creationId xmlns:a16="http://schemas.microsoft.com/office/drawing/2014/main" id="{81313DE9-2E81-41C4-918F-86875267B812}"/>
+              </a:ext>
+            </a:extLst>
+          </p:cNvPr>
+          <p:cNvSpPr>
+            <a:spLocks noGrp="1"/>
+          </p:cNvSpPr>
+          <p:nvPr>
+            <p:ph type="title"/>
+          </p:nvPr>
+        </p:nvSpPr>
+        <p:spPr/>
+        <p:txBody>
+          <a:bodyPr/>
+          <a:lstStyle/>
+          <a:p>
+            <a:r>
+              <a:rPr lang="en-US" dirty="0"/>
+              <a:t>Deployment</a:t>
+            </a:r>
+          </a:p>
+        </p:txBody>
+      </p:sp>
+      <p:pic>
+        <p:nvPicPr>
+          <p:cNvPr id="4" name="Content Placeholder 3">
+            <a:extLst>
+              <a:ext uri="{FF2B5EF4-FFF2-40B4-BE49-F238E27FC236}">
+                <a16:creationId xmlns:a16="http://schemas.microsoft.com/office/drawing/2014/main" id="{32DCC058-3C23-4A90-B2A3-8BDAD603EA76}"/>
+              </a:ext>
+            </a:extLst>
+          </p:cNvPr>
+          <p:cNvPicPr>
+            <a:picLocks noGrp="1" noChangeAspect="1"/>
+          </p:cNvPicPr>
+          <p:nvPr>
+            <p:ph idx="1"/>
+          </p:nvPr>
+        </p:nvPicPr>
+        <p:blipFill>
+          <a:blip r:embed="rId2"/>
+          <a:stretch>
+            <a:fillRect/>
+          </a:stretch>
+        </p:blipFill>
+        <p:spPr>
+          <a:xfrm>
+            <a:off x="2559977" y="974725"/>
+            <a:ext cx="7062521" cy="4897438"/>
+          </a:xfrm>
+          <a:prstGeom prst="rect">
+            <a:avLst/>
+          </a:prstGeom>
+        </p:spPr>
+      </p:pic>
+    </p:spTree>
+    <p:extLst>
+      <p:ext uri="{BB962C8B-B14F-4D97-AF65-F5344CB8AC3E}">
+        <p14:creationId xmlns:p14="http://schemas.microsoft.com/office/powerpoint/2010/main" val="433068583"/>
+      </p:ext>
+    </p:extLst>
+  </p:cSld>
+  <p:clrMapOvr>
+    <a:masterClrMapping/>
+  </p:clrMapOvr>
+</p:sld>
+</file>
+
+<file path=ppt/slides/slide18.xml><?xml version="1.0" encoding="utf-8"?>
+<p:sld xmlns:a="http://schemas.openxmlformats.org/drawingml/2006/main" xmlns:r="http://schemas.openxmlformats.org/officeDocument/2006/relationships" xmlns:p="http://schemas.openxmlformats.org/presentationml/2006/main">
+  <p:cSld>
+    <p:spTree>
+      <p:nvGrpSpPr>
+        <p:cNvPr id="1" name=""/>
+        <p:cNvGrpSpPr/>
+        <p:nvPr/>
+      </p:nvGrpSpPr>
+      <p:grpSpPr>
+        <a:xfrm>
+          <a:off x="0" y="0"/>
+          <a:ext cx="0" cy="0"/>
+          <a:chOff x="0" y="0"/>
+          <a:chExt cx="0" cy="0"/>
+        </a:xfrm>
+      </p:grpSpPr>
+      <p:sp>
+        <p:nvSpPr>
+          <p:cNvPr id="2" name="Title 1">
+            <a:extLst>
+              <a:ext uri="{FF2B5EF4-FFF2-40B4-BE49-F238E27FC236}">
+                <a16:creationId xmlns:a16="http://schemas.microsoft.com/office/drawing/2014/main" id="{899A3CB7-10EE-4C09-BEEF-18D2CEF0113E}"/>
+              </a:ext>
+            </a:extLst>
+          </p:cNvPr>
+          <p:cNvSpPr>
+            <a:spLocks noGrp="1"/>
+          </p:cNvSpPr>
+          <p:nvPr>
+            <p:ph type="title"/>
+          </p:nvPr>
+        </p:nvSpPr>
+        <p:spPr/>
+        <p:txBody>
+          <a:bodyPr/>
+          <a:lstStyle/>
+          <a:p>
+            <a:r>
+              <a:rPr lang="en-US" dirty="0"/>
+              <a:t>Conclusion</a:t>
+            </a:r>
+          </a:p>
+        </p:txBody>
+      </p:sp>
+      <p:sp>
+        <p:nvSpPr>
+          <p:cNvPr id="3" name="Content Placeholder 2">
+            <a:extLst>
+              <a:ext uri="{FF2B5EF4-FFF2-40B4-BE49-F238E27FC236}">
+                <a16:creationId xmlns:a16="http://schemas.microsoft.com/office/drawing/2014/main" id="{6A4767EB-4F86-42AD-AE97-F7C0EC2E2A84}"/>
+              </a:ext>
+            </a:extLst>
+          </p:cNvPr>
+          <p:cNvSpPr>
+            <a:spLocks noGrp="1"/>
+          </p:cNvSpPr>
+          <p:nvPr>
+            <p:ph idx="1"/>
+          </p:nvPr>
+        </p:nvSpPr>
+        <p:spPr/>
+        <p:txBody>
+          <a:bodyPr/>
+          <a:lstStyle/>
+          <a:p>
+            <a:r>
+              <a:rPr lang="en-US" dirty="0"/>
+              <a:t>Before creating modules check available modules</a:t>
+            </a:r>
+          </a:p>
+          <a:p>
+            <a:r>
+              <a:rPr lang="en-US" dirty="0"/>
+              <a:t>Choose the right execution template</a:t>
+            </a:r>
+          </a:p>
+          <a:p>
+            <a:r>
+              <a:rPr lang="en-US" dirty="0"/>
+              <a:t>Create the configuration</a:t>
+            </a:r>
+          </a:p>
+          <a:p>
+            <a:r>
+              <a:rPr lang="en-US" dirty="0"/>
+              <a:t>Update include VIs</a:t>
+            </a:r>
+          </a:p>
+          <a:p>
+            <a:r>
+              <a:rPr lang="en-US" dirty="0"/>
+              <a:t>Deploy Configuration</a:t>
+            </a:r>
+          </a:p>
+          <a:p>
+            <a:endParaRPr lang="en-US" dirty="0"/>
+          </a:p>
+          <a:p>
+            <a:r>
+              <a:rPr lang="en-US" dirty="0"/>
+              <a:t>Most likely you will need at least 1 custom module most likely a static module and that is cover on the next session</a:t>
+            </a:r>
+          </a:p>
+          <a:p>
+            <a:endParaRPr lang="en-US" dirty="0"/>
+          </a:p>
+          <a:p>
+            <a:endParaRPr lang="en-US" dirty="0"/>
+          </a:p>
+        </p:txBody>
+      </p:sp>
+    </p:spTree>
+    <p:extLst>
+      <p:ext uri="{BB962C8B-B14F-4D97-AF65-F5344CB8AC3E}">
+        <p14:creationId xmlns:p14="http://schemas.microsoft.com/office/powerpoint/2010/main" val="869522824"/>
+      </p:ext>
+    </p:extLst>
+  </p:cSld>
+  <p:clrMapOvr>
+    <a:masterClrMapping/>
+  </p:clrMapOvr>
+</p:sld>
+</file>
+
 <file path=ppt/slides/slide2.xml><?xml version="1.0" encoding="utf-8"?>
 <p:sld xmlns:a="http://schemas.openxmlformats.org/drawingml/2006/main" xmlns:r="http://schemas.openxmlformats.org/officeDocument/2006/relationships" xmlns:p="http://schemas.openxmlformats.org/presentationml/2006/main">
   <p:cSld>
@@ -7681,10 +8722,10 @@
       </p:grpSpPr>
       <p:sp>
         <p:nvSpPr>
-          <p:cNvPr id="2" name="Title 1">
+          <p:cNvPr id="4" name="Title 3">
             <a:extLst>
               <a:ext uri="{FF2B5EF4-FFF2-40B4-BE49-F238E27FC236}">
-                <a16:creationId xmlns:a16="http://schemas.microsoft.com/office/drawing/2014/main" id="{4F96DFFD-34A9-467B-9ECB-E02BF2E6D169}"/>
+                <a16:creationId xmlns:a16="http://schemas.microsoft.com/office/drawing/2014/main" id="{872E2147-8AB6-4E99-9959-D79A5FD39F85}"/>
               </a:ext>
             </a:extLst>
           </p:cNvPr>
@@ -7709,10 +8750,10 @@
       </p:sp>
       <p:sp>
         <p:nvSpPr>
-          <p:cNvPr id="3" name="Content Placeholder 2">
+          <p:cNvPr id="5" name="Content Placeholder 4">
             <a:extLst>
               <a:ext uri="{FF2B5EF4-FFF2-40B4-BE49-F238E27FC236}">
-                <a16:creationId xmlns:a16="http://schemas.microsoft.com/office/drawing/2014/main" id="{D5362C0F-E65F-4A47-B183-AEC0C2A3F8EE}"/>
+                <a16:creationId xmlns:a16="http://schemas.microsoft.com/office/drawing/2014/main" id="{A2979F31-C5CA-4FA1-B4D5-58BC8BE5D69D}"/>
               </a:ext>
             </a:extLst>
           </p:cNvPr>
@@ -7730,101 +8771,42 @@
           <a:p>
             <a:r>
               <a:rPr lang="en-US" dirty="0"/>
-              <a:t>Defining this chapter project.</a:t>
-            </a:r>
-          </a:p>
-          <a:p>
-            <a:r>
-              <a:rPr lang="en-US" dirty="0"/>
-              <a:t>Deciding on Runtime template</a:t>
-            </a:r>
-          </a:p>
-          <a:p>
-            <a:r>
-              <a:rPr lang="en-US" dirty="0"/>
-              <a:t>Exercise 1</a:t>
-            </a:r>
-          </a:p>
-          <a:p>
-            <a:pPr lvl="1"/>
-            <a:r>
-              <a:rPr lang="en-US" dirty="0"/>
-              <a:t> Use runtime template</a:t>
-            </a:r>
-          </a:p>
-          <a:p>
-            <a:pPr lvl="1"/>
-            <a:r>
-              <a:rPr lang="en-US" dirty="0"/>
-              <a:t> Explain parts of the template</a:t>
-            </a:r>
-          </a:p>
-          <a:p>
-            <a:r>
-              <a:rPr lang="en-US" dirty="0"/>
-              <a:t>Getting available modules, </a:t>
-            </a:r>
-          </a:p>
-          <a:p>
-            <a:pPr lvl="1"/>
-            <a:r>
-              <a:rPr lang="en-US" dirty="0"/>
-              <a:t>Module Search path</a:t>
-            </a:r>
-          </a:p>
-          <a:p>
-            <a:r>
-              <a:rPr lang="en-US" dirty="0"/>
-              <a:t>Exercise 2 </a:t>
-            </a:r>
-          </a:p>
-          <a:p>
-            <a:pPr lvl="1"/>
-            <a:r>
-              <a:rPr lang="en-US" dirty="0"/>
-              <a:t>Getting new module</a:t>
-            </a:r>
-          </a:p>
-          <a:p>
-            <a:pPr lvl="1"/>
-            <a:r>
-              <a:rPr lang="en-US" dirty="0"/>
-              <a:t>Adding it to search Path</a:t>
-            </a:r>
-          </a:p>
-          <a:p>
-            <a:r>
-              <a:rPr lang="en-US" dirty="0"/>
-              <a:t>Exercise 3</a:t>
-            </a:r>
-          </a:p>
-          <a:p>
-            <a:pPr lvl="1"/>
-            <a:r>
-              <a:rPr lang="en-US" dirty="0"/>
-              <a:t>Create configuration</a:t>
-            </a:r>
-          </a:p>
-          <a:p>
-            <a:pPr lvl="1"/>
-            <a:r>
-              <a:rPr lang="en-US" dirty="0"/>
-              <a:t>Script Includes</a:t>
-            </a:r>
-          </a:p>
-          <a:p>
-            <a:pPr lvl="1"/>
-            <a:r>
-              <a:rPr lang="en-US" dirty="0"/>
-              <a:t>Deploy Tool</a:t>
-            </a:r>
+              <a:t>Class Project 1</a:t>
+            </a:r>
+          </a:p>
+          <a:p>
+            <a:r>
+              <a:rPr lang="en-US" dirty="0"/>
+              <a:t>Runtime Templates</a:t>
+            </a:r>
+          </a:p>
+          <a:p>
+            <a:r>
+              <a:rPr lang="en-US" dirty="0"/>
+              <a:t>Configuration Editor</a:t>
+            </a:r>
+          </a:p>
+          <a:p>
+            <a:r>
+              <a:rPr lang="en-US" dirty="0"/>
+              <a:t>Finding Modules</a:t>
+            </a:r>
+          </a:p>
+          <a:p>
+            <a:r>
+              <a:rPr lang="en-US" dirty="0"/>
+              <a:t>Configuration File</a:t>
+            </a:r>
+          </a:p>
+          <a:p>
+            <a:endParaRPr lang="en-US" dirty="0"/>
           </a:p>
         </p:txBody>
       </p:sp>
     </p:spTree>
     <p:extLst>
       <p:ext uri="{BB962C8B-B14F-4D97-AF65-F5344CB8AC3E}">
-        <p14:creationId xmlns:p14="http://schemas.microsoft.com/office/powerpoint/2010/main" val="168095988"/>
+        <p14:creationId xmlns:p14="http://schemas.microsoft.com/office/powerpoint/2010/main" val="3291487446"/>
       </p:ext>
     </p:extLst>
   </p:cSld>
@@ -7835,7 +8817,7 @@
 </file>
 
 <file path=ppt/slides/slide3.xml><?xml version="1.0" encoding="utf-8"?>
-<p:sld xmlns:a="http://schemas.openxmlformats.org/drawingml/2006/main" xmlns:r="http://schemas.openxmlformats.org/officeDocument/2006/relationships" xmlns:p="http://schemas.openxmlformats.org/presentationml/2006/main">
+<p:sld xmlns:a="http://schemas.openxmlformats.org/drawingml/2006/main" xmlns:r="http://schemas.openxmlformats.org/officeDocument/2006/relationships" xmlns:p="http://schemas.openxmlformats.org/presentationml/2006/main" show="0">
   <p:cSld>
     <p:spTree>
       <p:nvGrpSpPr>
@@ -7856,7 +8838,7 @@
           <p:cNvPr id="2" name="Title 1">
             <a:extLst>
               <a:ext uri="{FF2B5EF4-FFF2-40B4-BE49-F238E27FC236}">
-                <a16:creationId xmlns:a16="http://schemas.microsoft.com/office/drawing/2014/main" id="{EA01510D-4EE2-48EF-BC22-56F6BA405A1B}"/>
+                <a16:creationId xmlns:a16="http://schemas.microsoft.com/office/drawing/2014/main" id="{4F96DFFD-34A9-467B-9ECB-E02BF2E6D169}"/>
               </a:ext>
             </a:extLst>
           </p:cNvPr>
@@ -7874,7 +8856,7 @@
           <a:p>
             <a:r>
               <a:rPr lang="en-US" dirty="0"/>
-              <a:t>Exercise project. </a:t>
+              <a:t>Agenda</a:t>
             </a:r>
           </a:p>
         </p:txBody>
@@ -7884,7 +8866,7 @@
           <p:cNvPr id="3" name="Content Placeholder 2">
             <a:extLst>
               <a:ext uri="{FF2B5EF4-FFF2-40B4-BE49-F238E27FC236}">
-                <a16:creationId xmlns:a16="http://schemas.microsoft.com/office/drawing/2014/main" id="{AC77A7A3-374E-43B3-A672-9A8684D83DE8}"/>
+                <a16:creationId xmlns:a16="http://schemas.microsoft.com/office/drawing/2014/main" id="{D5362C0F-E65F-4A47-B183-AEC0C2A3F8EE}"/>
               </a:ext>
             </a:extLst>
           </p:cNvPr>
@@ -7902,24 +8884,101 @@
           <a:p>
             <a:r>
               <a:rPr lang="en-US" dirty="0"/>
-              <a:t>Simple PID control </a:t>
-            </a:r>
-          </a:p>
-          <a:p>
-            <a:r>
-              <a:rPr lang="en-US" dirty="0"/>
-              <a:t>Need UI</a:t>
-            </a:r>
-          </a:p>
-          <a:p>
-            <a:endParaRPr lang="en-US" dirty="0"/>
+              <a:t>Defining this chapter project.</a:t>
+            </a:r>
+          </a:p>
+          <a:p>
+            <a:r>
+              <a:rPr lang="en-US" dirty="0"/>
+              <a:t>Deciding on Runtime template</a:t>
+            </a:r>
+          </a:p>
+          <a:p>
+            <a:r>
+              <a:rPr lang="en-US" dirty="0"/>
+              <a:t>Exercise 1</a:t>
+            </a:r>
+          </a:p>
+          <a:p>
+            <a:pPr lvl="1"/>
+            <a:r>
+              <a:rPr lang="en-US" dirty="0"/>
+              <a:t> Use runtime template</a:t>
+            </a:r>
+          </a:p>
+          <a:p>
+            <a:pPr lvl="1"/>
+            <a:r>
+              <a:rPr lang="en-US" dirty="0"/>
+              <a:t> Explain parts of the template</a:t>
+            </a:r>
+          </a:p>
+          <a:p>
+            <a:r>
+              <a:rPr lang="en-US" dirty="0"/>
+              <a:t>Getting available modules, </a:t>
+            </a:r>
+          </a:p>
+          <a:p>
+            <a:pPr lvl="1"/>
+            <a:r>
+              <a:rPr lang="en-US" dirty="0"/>
+              <a:t>Module Search path</a:t>
+            </a:r>
+          </a:p>
+          <a:p>
+            <a:r>
+              <a:rPr lang="en-US" dirty="0"/>
+              <a:t>Exercise 2 </a:t>
+            </a:r>
+          </a:p>
+          <a:p>
+            <a:pPr lvl="1"/>
+            <a:r>
+              <a:rPr lang="en-US" dirty="0"/>
+              <a:t>Getting new module</a:t>
+            </a:r>
+          </a:p>
+          <a:p>
+            <a:pPr lvl="1"/>
+            <a:r>
+              <a:rPr lang="en-US" dirty="0"/>
+              <a:t>Adding it to search Path</a:t>
+            </a:r>
+          </a:p>
+          <a:p>
+            <a:r>
+              <a:rPr lang="en-US" dirty="0"/>
+              <a:t>Exercise 3</a:t>
+            </a:r>
+          </a:p>
+          <a:p>
+            <a:pPr lvl="1"/>
+            <a:r>
+              <a:rPr lang="en-US" dirty="0"/>
+              <a:t>Create configuration</a:t>
+            </a:r>
+          </a:p>
+          <a:p>
+            <a:pPr lvl="1"/>
+            <a:r>
+              <a:rPr lang="en-US" dirty="0"/>
+              <a:t>Script Includes</a:t>
+            </a:r>
+          </a:p>
+          <a:p>
+            <a:pPr lvl="1"/>
+            <a:r>
+              <a:rPr lang="en-US" dirty="0"/>
+              <a:t>Deploy Tool</a:t>
+            </a:r>
           </a:p>
         </p:txBody>
       </p:sp>
     </p:spTree>
     <p:extLst>
       <p:ext uri="{BB962C8B-B14F-4D97-AF65-F5344CB8AC3E}">
-        <p14:creationId xmlns:p14="http://schemas.microsoft.com/office/powerpoint/2010/main" val="2078799346"/>
+        <p14:creationId xmlns:p14="http://schemas.microsoft.com/office/powerpoint/2010/main" val="168095988"/>
       </p:ext>
     </p:extLst>
   </p:cSld>
@@ -7948,7 +9007,13 @@
       </p:grpSpPr>
       <p:sp>
         <p:nvSpPr>
-          <p:cNvPr id="2" name="Title 1"/>
+          <p:cNvPr id="2" name="Title 1">
+            <a:extLst>
+              <a:ext uri="{FF2B5EF4-FFF2-40B4-BE49-F238E27FC236}">
+                <a16:creationId xmlns:a16="http://schemas.microsoft.com/office/drawing/2014/main" id="{EA01510D-4EE2-48EF-BC22-56F6BA405A1B}"/>
+              </a:ext>
+            </a:extLst>
+          </p:cNvPr>
           <p:cNvSpPr>
             <a:spLocks noGrp="1"/>
           </p:cNvSpPr>
@@ -7963,14 +9028,20 @@
           <a:p>
             <a:r>
               <a:rPr lang="en-US" dirty="0"/>
-              <a:t> What type of module do I need</a:t>
-            </a:r>
-          </a:p>
-        </p:txBody>
-      </p:sp>
-      <p:sp>
-        <p:nvSpPr>
-          <p:cNvPr id="3" name="Content Placeholder 2"/>
+              <a:t>Exercise project With Hardware. </a:t>
+            </a:r>
+          </a:p>
+        </p:txBody>
+      </p:sp>
+      <p:sp>
+        <p:nvSpPr>
+          <p:cNvPr id="3" name="Content Placeholder 2">
+            <a:extLst>
+              <a:ext uri="{FF2B5EF4-FFF2-40B4-BE49-F238E27FC236}">
+                <a16:creationId xmlns:a16="http://schemas.microsoft.com/office/drawing/2014/main" id="{AC77A7A3-374E-43B3-A672-9A8684D83DE8}"/>
+              </a:ext>
+            </a:extLst>
+          </p:cNvPr>
           <p:cNvSpPr>
             <a:spLocks noGrp="1"/>
           </p:cNvSpPr>
@@ -7978,63 +9049,124 @@
             <p:ph idx="1"/>
           </p:nvPr>
         </p:nvSpPr>
-        <p:spPr/>
+        <p:spPr>
+          <a:xfrm>
+            <a:off x="605367" y="1088571"/>
+            <a:ext cx="3929311" cy="4826603"/>
+          </a:xfrm>
+          <a:ln>
+            <a:solidFill>
+              <a:schemeClr val="bg1"/>
+            </a:solidFill>
+          </a:ln>
+        </p:spPr>
+        <p:style>
+          <a:lnRef idx="2">
+            <a:schemeClr val="dk1"/>
+          </a:lnRef>
+          <a:fillRef idx="1">
+            <a:schemeClr val="lt1"/>
+          </a:fillRef>
+          <a:effectRef idx="0">
+            <a:schemeClr val="dk1"/>
+          </a:effectRef>
+          <a:fontRef idx="minor">
+            <a:schemeClr val="dk1"/>
+          </a:fontRef>
+        </p:style>
         <p:txBody>
           <a:bodyPr/>
           <a:lstStyle/>
           <a:p>
+            <a:r>
+              <a:rPr lang="en-US" dirty="0"/>
+              <a:t>2 Engines</a:t>
+            </a:r>
+          </a:p>
+          <a:p>
+            <a:r>
+              <a:rPr lang="en-US" dirty="0"/>
+              <a:t>UDP for E3E</a:t>
+            </a:r>
+          </a:p>
+          <a:p>
+            <a:r>
+              <a:rPr lang="en-US" dirty="0"/>
+              <a:t>Temperature control</a:t>
+            </a:r>
+          </a:p>
+          <a:p>
+            <a:r>
+              <a:rPr lang="en-US" dirty="0"/>
+              <a:t>Acquire Data Scan Engine</a:t>
+            </a:r>
+          </a:p>
+          <a:p>
+            <a:r>
+              <a:rPr lang="en-US" dirty="0"/>
+              <a:t>PID Control</a:t>
+            </a:r>
+          </a:p>
+          <a:p>
+            <a:r>
+              <a:rPr lang="en-US" dirty="0"/>
+              <a:t>Log To Disk</a:t>
+            </a:r>
+          </a:p>
+          <a:p>
+            <a:r>
+              <a:rPr lang="en-US" dirty="0"/>
+              <a:t>UI</a:t>
+            </a:r>
+          </a:p>
+          <a:p>
             <a:endParaRPr lang="en-US" dirty="0"/>
           </a:p>
           <a:p>
-            <a:r>
-              <a:rPr lang="en-US" dirty="0"/>
-              <a:t>Do we really need a custom module??</a:t>
-            </a:r>
-          </a:p>
-          <a:p>
-            <a:pPr lvl="1"/>
-            <a:r>
-              <a:rPr lang="en-US" dirty="0"/>
-              <a:t>Use Existing modules</a:t>
-            </a:r>
-          </a:p>
-          <a:p>
-            <a:pPr lvl="1"/>
-            <a:r>
-              <a:rPr lang="en-US" dirty="0"/>
-              <a:t>Modify </a:t>
-            </a:r>
-            <a:r>
-              <a:rPr lang="en-US"/>
-              <a:t>Existing modules</a:t>
-            </a:r>
+            <a:pPr marL="0" indent="0">
+              <a:buNone/>
+            </a:pPr>
             <a:endParaRPr lang="en-US" dirty="0"/>
           </a:p>
           <a:p>
-            <a:r>
-              <a:rPr lang="en-US"/>
-              <a:t>When </a:t>
-            </a:r>
-            <a:r>
-              <a:rPr lang="en-US" dirty="0"/>
-              <a:t>do you define the inputs and outputs</a:t>
-            </a:r>
-          </a:p>
-          <a:p>
-            <a:r>
-              <a:rPr lang="en-US" dirty="0"/>
-              <a:t>What is the module doing</a:t>
-            </a:r>
-          </a:p>
-          <a:p>
             <a:endParaRPr lang="en-US" dirty="0"/>
           </a:p>
         </p:txBody>
       </p:sp>
+      <p:pic>
+        <p:nvPicPr>
+          <p:cNvPr id="5" name="Picture 4">
+            <a:extLst>
+              <a:ext uri="{FF2B5EF4-FFF2-40B4-BE49-F238E27FC236}">
+                <a16:creationId xmlns:a16="http://schemas.microsoft.com/office/drawing/2014/main" id="{9BF44AA2-4711-4BF2-BEE1-C51487416F91}"/>
+              </a:ext>
+            </a:extLst>
+          </p:cNvPr>
+          <p:cNvPicPr>
+            <a:picLocks noChangeAspect="1"/>
+          </p:cNvPicPr>
+          <p:nvPr/>
+        </p:nvPicPr>
+        <p:blipFill>
+          <a:blip r:embed="rId3"/>
+          <a:stretch>
+            <a:fillRect/>
+          </a:stretch>
+        </p:blipFill>
+        <p:spPr>
+          <a:xfrm>
+            <a:off x="4534678" y="1631296"/>
+            <a:ext cx="6210300" cy="3057525"/>
+          </a:xfrm>
+          <a:prstGeom prst="rect">
+            <a:avLst/>
+          </a:prstGeom>
+        </p:spPr>
+      </p:pic>
     </p:spTree>
     <p:extLst>
       <p:ext uri="{BB962C8B-B14F-4D97-AF65-F5344CB8AC3E}">
-        <p14:creationId xmlns:p14="http://schemas.microsoft.com/office/powerpoint/2010/main" val="531330835"/>
+        <p14:creationId xmlns:p14="http://schemas.microsoft.com/office/powerpoint/2010/main" val="2078799346"/>
       </p:ext>
     </p:extLst>
   </p:cSld>
@@ -8045,7 +9177,7 @@
 </file>
 
 <file path=ppt/slides/slide5.xml><?xml version="1.0" encoding="utf-8"?>
-<p:sld xmlns:a="http://schemas.openxmlformats.org/drawingml/2006/main" xmlns:r="http://schemas.openxmlformats.org/officeDocument/2006/relationships" xmlns:p="http://schemas.openxmlformats.org/presentationml/2006/main" show="0">
+<p:sld xmlns:a="http://schemas.openxmlformats.org/drawingml/2006/main" xmlns:r="http://schemas.openxmlformats.org/officeDocument/2006/relationships" xmlns:p="http://schemas.openxmlformats.org/presentationml/2006/main">
   <p:cSld>
     <p:spTree>
       <p:nvGrpSpPr>
@@ -8063,7 +9195,13 @@
       </p:grpSpPr>
       <p:sp>
         <p:nvSpPr>
-          <p:cNvPr id="2" name="Title 1"/>
+          <p:cNvPr id="2" name="Title 1">
+            <a:extLst>
+              <a:ext uri="{FF2B5EF4-FFF2-40B4-BE49-F238E27FC236}">
+                <a16:creationId xmlns:a16="http://schemas.microsoft.com/office/drawing/2014/main" id="{596ADAAC-4284-4BA9-8D7D-7489ADCE5773}"/>
+              </a:ext>
+            </a:extLst>
+          </p:cNvPr>
           <p:cNvSpPr>
             <a:spLocks noGrp="1"/>
           </p:cNvSpPr>
@@ -8078,14 +9216,20 @@
           <a:p>
             <a:r>
               <a:rPr lang="en-US" dirty="0"/>
-              <a:t>Which Template to Choose</a:t>
-            </a:r>
-          </a:p>
-        </p:txBody>
-      </p:sp>
-      <p:sp>
-        <p:nvSpPr>
-          <p:cNvPr id="3" name="Content Placeholder 2"/>
+              <a:t>Exercise Project without Hardware</a:t>
+            </a:r>
+          </a:p>
+        </p:txBody>
+      </p:sp>
+      <p:sp>
+        <p:nvSpPr>
+          <p:cNvPr id="4" name="Content Placeholder 3">
+            <a:extLst>
+              <a:ext uri="{FF2B5EF4-FFF2-40B4-BE49-F238E27FC236}">
+                <a16:creationId xmlns:a16="http://schemas.microsoft.com/office/drawing/2014/main" id="{8818BA06-EC07-41B6-830A-F9DD37983455}"/>
+              </a:ext>
+            </a:extLst>
+          </p:cNvPr>
           <p:cNvSpPr>
             <a:spLocks noGrp="1"/>
           </p:cNvSpPr>
@@ -8100,62 +9244,43 @@
           <a:p>
             <a:r>
               <a:rPr lang="en-US" dirty="0"/>
-              <a:t>Dynamic</a:t>
-            </a:r>
-          </a:p>
-          <a:p>
-            <a:pPr lvl="1"/>
-            <a:r>
-              <a:rPr lang="en-US" dirty="0"/>
-              <a:t>Unknown number of Channels.</a:t>
-            </a:r>
-          </a:p>
-          <a:p>
-            <a:pPr lvl="1"/>
-            <a:r>
-              <a:rPr lang="en-US" dirty="0"/>
-              <a:t>Final user defines the inputs</a:t>
-            </a:r>
-          </a:p>
-          <a:p>
-            <a:pPr lvl="1"/>
-            <a:r>
-              <a:rPr lang="en-US" dirty="0"/>
-              <a:t>Modbus</a:t>
-            </a:r>
-          </a:p>
-          <a:p>
-            <a:pPr lvl="1"/>
-            <a:r>
-              <a:rPr lang="en-US" dirty="0"/>
-              <a:t>Needs more codding</a:t>
-            </a:r>
-          </a:p>
-          <a:p>
-            <a:r>
-              <a:rPr lang="en-US" dirty="0"/>
-              <a:t>Static Template</a:t>
-            </a:r>
-          </a:p>
-          <a:p>
-            <a:pPr lvl="1"/>
-            <a:r>
-              <a:rPr lang="en-US" dirty="0"/>
-              <a:t>Number of channels decided by module developer</a:t>
-            </a:r>
-          </a:p>
-          <a:p>
-            <a:pPr lvl="1"/>
-            <a:r>
-              <a:rPr lang="en-US" dirty="0"/>
-              <a:t>Mostly Scripted</a:t>
-            </a:r>
-          </a:p>
-          <a:p>
-            <a:pPr lvl="1"/>
-            <a:r>
-              <a:rPr lang="en-US" dirty="0"/>
-              <a:t>PID</a:t>
+              <a:t>2 Engines</a:t>
+            </a:r>
+          </a:p>
+          <a:p>
+            <a:r>
+              <a:rPr lang="en-US" dirty="0"/>
+              <a:t>UDP for E3E</a:t>
+            </a:r>
+          </a:p>
+          <a:p>
+            <a:r>
+              <a:rPr lang="en-US" dirty="0"/>
+              <a:t>Temperature control</a:t>
+            </a:r>
+          </a:p>
+          <a:p>
+            <a:r>
+              <a:rPr lang="en-US" dirty="0"/>
+              <a:t>Acquire Data Scan Engine</a:t>
+            </a:r>
+          </a:p>
+          <a:p>
+            <a:r>
+              <a:rPr lang="en-US" dirty="0"/>
+              <a:t>PID Control</a:t>
+            </a:r>
+          </a:p>
+          <a:p>
+            <a:r>
+              <a:rPr lang="en-US" dirty="0"/>
+              <a:t>Log To Disk</a:t>
+            </a:r>
+          </a:p>
+          <a:p>
+            <a:r>
+              <a:rPr lang="en-US" dirty="0"/>
+              <a:t>UI</a:t>
             </a:r>
           </a:p>
           <a:p>
@@ -8163,10 +9288,40 @@
           </a:p>
         </p:txBody>
       </p:sp>
+      <p:pic>
+        <p:nvPicPr>
+          <p:cNvPr id="8" name="Picture 7">
+            <a:extLst>
+              <a:ext uri="{FF2B5EF4-FFF2-40B4-BE49-F238E27FC236}">
+                <a16:creationId xmlns:a16="http://schemas.microsoft.com/office/drawing/2014/main" id="{8A8D39D7-DBE8-4551-B7D0-35DC35931E49}"/>
+              </a:ext>
+            </a:extLst>
+          </p:cNvPr>
+          <p:cNvPicPr>
+            <a:picLocks noChangeAspect="1"/>
+          </p:cNvPicPr>
+          <p:nvPr/>
+        </p:nvPicPr>
+        <p:blipFill>
+          <a:blip r:embed="rId2"/>
+          <a:stretch>
+            <a:fillRect/>
+          </a:stretch>
+        </p:blipFill>
+        <p:spPr>
+          <a:xfrm>
+            <a:off x="3927380" y="2393296"/>
+            <a:ext cx="8014225" cy="2761410"/>
+          </a:xfrm>
+          <a:prstGeom prst="rect">
+            <a:avLst/>
+          </a:prstGeom>
+        </p:spPr>
+      </p:pic>
     </p:spTree>
     <p:extLst>
       <p:ext uri="{BB962C8B-B14F-4D97-AF65-F5344CB8AC3E}">
-        <p14:creationId xmlns:p14="http://schemas.microsoft.com/office/powerpoint/2010/main" val="2136668812"/>
+        <p14:creationId xmlns:p14="http://schemas.microsoft.com/office/powerpoint/2010/main" val="3647738486"/>
       </p:ext>
     </p:extLst>
   </p:cSld>
@@ -8195,7 +9350,13 @@
       </p:grpSpPr>
       <p:sp>
         <p:nvSpPr>
-          <p:cNvPr id="2" name="Title 1"/>
+          <p:cNvPr id="2" name="Title 1">
+            <a:extLst>
+              <a:ext uri="{FF2B5EF4-FFF2-40B4-BE49-F238E27FC236}">
+                <a16:creationId xmlns:a16="http://schemas.microsoft.com/office/drawing/2014/main" id="{138B53C3-D9A4-4D44-8B58-D17CCA2F23B1}"/>
+              </a:ext>
+            </a:extLst>
+          </p:cNvPr>
           <p:cNvSpPr>
             <a:spLocks noGrp="1"/>
           </p:cNvSpPr>
@@ -8210,91 +9371,317 @@
           <a:p>
             <a:r>
               <a:rPr lang="en-US" dirty="0"/>
-              <a:t>When do I define the inputs</a:t>
-            </a:r>
-          </a:p>
-        </p:txBody>
-      </p:sp>
-      <p:sp>
-        <p:nvSpPr>
-          <p:cNvPr id="3" name="Content Placeholder 2"/>
-          <p:cNvSpPr>
-            <a:spLocks noGrp="1"/>
-          </p:cNvSpPr>
+              <a:t>Runtime Templates</a:t>
+            </a:r>
+          </a:p>
+        </p:txBody>
+      </p:sp>
+      <p:pic>
+        <p:nvPicPr>
+          <p:cNvPr id="4" name="Content Placeholder 3">
+            <a:extLst>
+              <a:ext uri="{FF2B5EF4-FFF2-40B4-BE49-F238E27FC236}">
+                <a16:creationId xmlns:a16="http://schemas.microsoft.com/office/drawing/2014/main" id="{F5F9C006-6841-49E9-BDE5-6F6CC17204D0}"/>
+              </a:ext>
+            </a:extLst>
+          </p:cNvPr>
+          <p:cNvPicPr>
+            <a:picLocks noGrp="1" noChangeAspect="1"/>
+          </p:cNvPicPr>
           <p:nvPr>
             <p:ph idx="1"/>
           </p:nvPr>
-        </p:nvSpPr>
-        <p:spPr/>
-        <p:txBody>
-          <a:bodyPr/>
-          <a:lstStyle/>
-          <a:p>
-            <a:r>
-              <a:rPr lang="en-US" dirty="0"/>
-              <a:t>Configuration </a:t>
-            </a:r>
-          </a:p>
-          <a:p>
-            <a:pPr lvl="1"/>
-            <a:r>
-              <a:rPr lang="en-US" dirty="0"/>
-              <a:t>Unknown number of inputs. Final user defines the inputs</a:t>
-            </a:r>
-          </a:p>
-          <a:p>
-            <a:pPr lvl="1"/>
-            <a:r>
-              <a:rPr lang="en-US" dirty="0"/>
-              <a:t>Dynamic Template</a:t>
-            </a:r>
-          </a:p>
-          <a:p>
-            <a:pPr lvl="1"/>
-            <a:r>
-              <a:rPr lang="en-US" dirty="0"/>
-              <a:t>Modbus</a:t>
-            </a:r>
-          </a:p>
-          <a:p>
-            <a:endParaRPr lang="en-US" dirty="0"/>
-          </a:p>
-          <a:p>
-            <a:r>
-              <a:rPr lang="en-US" dirty="0"/>
-              <a:t>Development</a:t>
-            </a:r>
-          </a:p>
-          <a:p>
-            <a:pPr lvl="1"/>
-            <a:r>
-              <a:rPr lang="en-US" dirty="0"/>
-              <a:t>Always the same number of inputs</a:t>
-            </a:r>
-          </a:p>
-          <a:p>
-            <a:pPr lvl="1"/>
-            <a:r>
-              <a:rPr lang="en-US" dirty="0"/>
-              <a:t>Static Template</a:t>
-            </a:r>
-          </a:p>
-          <a:p>
-            <a:pPr lvl="1"/>
-            <a:r>
-              <a:rPr lang="en-US" dirty="0"/>
-              <a:t>PID</a:t>
-            </a:r>
-          </a:p>
-          <a:p>
-            <a:endParaRPr lang="en-US" dirty="0"/>
-          </a:p>
-        </p:txBody>
-      </p:sp>
+        </p:nvPicPr>
+        <p:blipFill>
+          <a:blip r:embed="rId2"/>
+          <a:stretch>
+            <a:fillRect/>
+          </a:stretch>
+        </p:blipFill>
+        <p:spPr>
+          <a:xfrm>
+            <a:off x="2993877" y="974725"/>
+            <a:ext cx="6194721" cy="4897438"/>
+          </a:xfrm>
+          <a:prstGeom prst="rect">
+            <a:avLst/>
+          </a:prstGeom>
+        </p:spPr>
+      </p:pic>
     </p:spTree>
     <p:extLst>
       <p:ext uri="{BB962C8B-B14F-4D97-AF65-F5344CB8AC3E}">
-        <p14:creationId xmlns:p14="http://schemas.microsoft.com/office/powerpoint/2010/main" val="2550728383"/>
+        <p14:creationId xmlns:p14="http://schemas.microsoft.com/office/powerpoint/2010/main" val="2690409735"/>
+      </p:ext>
+    </p:extLst>
+  </p:cSld>
+  <p:clrMapOvr>
+    <a:masterClrMapping/>
+  </p:clrMapOvr>
+</p:sld>
+</file>
+
+<file path=ppt/slides/slide7.xml><?xml version="1.0" encoding="utf-8"?>
+<p:sld xmlns:a="http://schemas.openxmlformats.org/drawingml/2006/main" xmlns:r="http://schemas.openxmlformats.org/officeDocument/2006/relationships" xmlns:p="http://schemas.openxmlformats.org/presentationml/2006/main">
+  <p:cSld>
+    <p:spTree>
+      <p:nvGrpSpPr>
+        <p:cNvPr id="1" name=""/>
+        <p:cNvGrpSpPr/>
+        <p:nvPr/>
+      </p:nvGrpSpPr>
+      <p:grpSpPr>
+        <a:xfrm>
+          <a:off x="0" y="0"/>
+          <a:ext cx="0" cy="0"/>
+          <a:chOff x="0" y="0"/>
+          <a:chExt cx="0" cy="0"/>
+        </a:xfrm>
+      </p:grpSpPr>
+      <p:sp>
+        <p:nvSpPr>
+          <p:cNvPr id="2" name="Title 1">
+            <a:extLst>
+              <a:ext uri="{FF2B5EF4-FFF2-40B4-BE49-F238E27FC236}">
+                <a16:creationId xmlns:a16="http://schemas.microsoft.com/office/drawing/2014/main" id="{8ED4F7AB-C4D0-4FF8-BD6B-208740D29861}"/>
+              </a:ext>
+            </a:extLst>
+          </p:cNvPr>
+          <p:cNvSpPr>
+            <a:spLocks noGrp="1"/>
+          </p:cNvSpPr>
+          <p:nvPr>
+            <p:ph type="title"/>
+          </p:nvPr>
+        </p:nvSpPr>
+        <p:spPr/>
+        <p:txBody>
+          <a:bodyPr/>
+          <a:lstStyle/>
+          <a:p>
+            <a:r>
+              <a:rPr lang="en-US" dirty="0"/>
+              <a:t>Basic Execution Template</a:t>
+            </a:r>
+          </a:p>
+        </p:txBody>
+      </p:sp>
+      <p:pic>
+        <p:nvPicPr>
+          <p:cNvPr id="4" name="Content Placeholder 3">
+            <a:extLst>
+              <a:ext uri="{FF2B5EF4-FFF2-40B4-BE49-F238E27FC236}">
+                <a16:creationId xmlns:a16="http://schemas.microsoft.com/office/drawing/2014/main" id="{8F85B72A-5CAB-431A-AE04-856981BC2CDF}"/>
+              </a:ext>
+            </a:extLst>
+          </p:cNvPr>
+          <p:cNvPicPr>
+            <a:picLocks noGrp="1" noChangeAspect="1"/>
+          </p:cNvPicPr>
+          <p:nvPr>
+            <p:ph idx="1"/>
+          </p:nvPr>
+        </p:nvPicPr>
+        <p:blipFill>
+          <a:blip r:embed="rId2"/>
+          <a:stretch>
+            <a:fillRect/>
+          </a:stretch>
+        </p:blipFill>
+        <p:spPr>
+          <a:xfrm>
+            <a:off x="604838" y="1274018"/>
+            <a:ext cx="10972800" cy="4298851"/>
+          </a:xfrm>
+          <a:prstGeom prst="rect">
+            <a:avLst/>
+          </a:prstGeom>
+        </p:spPr>
+      </p:pic>
+    </p:spTree>
+    <p:extLst>
+      <p:ext uri="{BB962C8B-B14F-4D97-AF65-F5344CB8AC3E}">
+        <p14:creationId xmlns:p14="http://schemas.microsoft.com/office/powerpoint/2010/main" val="2403433016"/>
+      </p:ext>
+    </p:extLst>
+  </p:cSld>
+  <p:clrMapOvr>
+    <a:masterClrMapping/>
+  </p:clrMapOvr>
+</p:sld>
+</file>
+
+<file path=ppt/slides/slide8.xml><?xml version="1.0" encoding="utf-8"?>
+<p:sld xmlns:a="http://schemas.openxmlformats.org/drawingml/2006/main" xmlns:r="http://schemas.openxmlformats.org/officeDocument/2006/relationships" xmlns:p="http://schemas.openxmlformats.org/presentationml/2006/main">
+  <p:cSld>
+    <p:spTree>
+      <p:nvGrpSpPr>
+        <p:cNvPr id="1" name=""/>
+        <p:cNvGrpSpPr/>
+        <p:nvPr/>
+      </p:nvGrpSpPr>
+      <p:grpSpPr>
+        <a:xfrm>
+          <a:off x="0" y="0"/>
+          <a:ext cx="0" cy="0"/>
+          <a:chOff x="0" y="0"/>
+          <a:chExt cx="0" cy="0"/>
+        </a:xfrm>
+      </p:grpSpPr>
+      <p:sp>
+        <p:nvSpPr>
+          <p:cNvPr id="2" name="Title 1">
+            <a:extLst>
+              <a:ext uri="{FF2B5EF4-FFF2-40B4-BE49-F238E27FC236}">
+                <a16:creationId xmlns:a16="http://schemas.microsoft.com/office/drawing/2014/main" id="{E9661CF7-4BD6-4AFA-9A0E-C685AB3B20FB}"/>
+              </a:ext>
+            </a:extLst>
+          </p:cNvPr>
+          <p:cNvSpPr>
+            <a:spLocks noGrp="1"/>
+          </p:cNvSpPr>
+          <p:nvPr>
+            <p:ph type="title"/>
+          </p:nvPr>
+        </p:nvSpPr>
+        <p:spPr/>
+        <p:txBody>
+          <a:bodyPr/>
+          <a:lstStyle/>
+          <a:p>
+            <a:r>
+              <a:rPr lang="en-US" dirty="0"/>
+              <a:t>Most Common Case of the template</a:t>
+            </a:r>
+          </a:p>
+        </p:txBody>
+      </p:sp>
+      <p:pic>
+        <p:nvPicPr>
+          <p:cNvPr id="4" name="Content Placeholder 3">
+            <a:extLst>
+              <a:ext uri="{FF2B5EF4-FFF2-40B4-BE49-F238E27FC236}">
+                <a16:creationId xmlns:a16="http://schemas.microsoft.com/office/drawing/2014/main" id="{D2473FA2-6302-4EB1-9566-5B30B231D6BD}"/>
+              </a:ext>
+            </a:extLst>
+          </p:cNvPr>
+          <p:cNvPicPr>
+            <a:picLocks noGrp="1" noChangeAspect="1"/>
+          </p:cNvPicPr>
+          <p:nvPr>
+            <p:ph idx="1"/>
+          </p:nvPr>
+        </p:nvPicPr>
+        <p:blipFill>
+          <a:blip r:embed="rId2"/>
+          <a:stretch>
+            <a:fillRect/>
+          </a:stretch>
+        </p:blipFill>
+        <p:spPr>
+          <a:xfrm>
+            <a:off x="604838" y="1733257"/>
+            <a:ext cx="10972800" cy="3380373"/>
+          </a:xfrm>
+          <a:prstGeom prst="rect">
+            <a:avLst/>
+          </a:prstGeom>
+        </p:spPr>
+      </p:pic>
+    </p:spTree>
+    <p:extLst>
+      <p:ext uri="{BB962C8B-B14F-4D97-AF65-F5344CB8AC3E}">
+        <p14:creationId xmlns:p14="http://schemas.microsoft.com/office/powerpoint/2010/main" val="3415237908"/>
+      </p:ext>
+    </p:extLst>
+  </p:cSld>
+  <p:clrMapOvr>
+    <a:masterClrMapping/>
+  </p:clrMapOvr>
+</p:sld>
+</file>
+
+<file path=ppt/slides/slide9.xml><?xml version="1.0" encoding="utf-8"?>
+<p:sld xmlns:a="http://schemas.openxmlformats.org/drawingml/2006/main" xmlns:r="http://schemas.openxmlformats.org/officeDocument/2006/relationships" xmlns:p="http://schemas.openxmlformats.org/presentationml/2006/main">
+  <p:cSld>
+    <p:spTree>
+      <p:nvGrpSpPr>
+        <p:cNvPr id="1" name=""/>
+        <p:cNvGrpSpPr/>
+        <p:nvPr/>
+      </p:nvGrpSpPr>
+      <p:grpSpPr>
+        <a:xfrm>
+          <a:off x="0" y="0"/>
+          <a:ext cx="0" cy="0"/>
+          <a:chOff x="0" y="0"/>
+          <a:chExt cx="0" cy="0"/>
+        </a:xfrm>
+      </p:grpSpPr>
+      <p:sp>
+        <p:nvSpPr>
+          <p:cNvPr id="2" name="Title 1">
+            <a:extLst>
+              <a:ext uri="{FF2B5EF4-FFF2-40B4-BE49-F238E27FC236}">
+                <a16:creationId xmlns:a16="http://schemas.microsoft.com/office/drawing/2014/main" id="{924E99AA-3FDB-4310-B90B-3A7E8429642D}"/>
+              </a:ext>
+            </a:extLst>
+          </p:cNvPr>
+          <p:cNvSpPr>
+            <a:spLocks noGrp="1"/>
+          </p:cNvSpPr>
+          <p:nvPr>
+            <p:ph type="title"/>
+          </p:nvPr>
+        </p:nvSpPr>
+        <p:spPr/>
+        <p:txBody>
+          <a:bodyPr/>
+          <a:lstStyle/>
+          <a:p>
+            <a:r>
+              <a:rPr lang="en-US" dirty="0"/>
+              <a:t>Services template</a:t>
+            </a:r>
+          </a:p>
+        </p:txBody>
+      </p:sp>
+      <p:pic>
+        <p:nvPicPr>
+          <p:cNvPr id="4" name="Content Placeholder 3">
+            <a:extLst>
+              <a:ext uri="{FF2B5EF4-FFF2-40B4-BE49-F238E27FC236}">
+                <a16:creationId xmlns:a16="http://schemas.microsoft.com/office/drawing/2014/main" id="{61C3ED78-3D59-40A1-9B14-3AD81FB68386}"/>
+              </a:ext>
+            </a:extLst>
+          </p:cNvPr>
+          <p:cNvPicPr>
+            <a:picLocks noGrp="1" noChangeAspect="1"/>
+          </p:cNvPicPr>
+          <p:nvPr>
+            <p:ph idx="1"/>
+          </p:nvPr>
+        </p:nvPicPr>
+        <p:blipFill>
+          <a:blip r:embed="rId2"/>
+          <a:stretch>
+            <a:fillRect/>
+          </a:stretch>
+        </p:blipFill>
+        <p:spPr>
+          <a:xfrm>
+            <a:off x="2104003" y="974725"/>
+            <a:ext cx="7974469" cy="4897438"/>
+          </a:xfrm>
+          <a:prstGeom prst="rect">
+            <a:avLst/>
+          </a:prstGeom>
+        </p:spPr>
+      </p:pic>
+    </p:spTree>
+    <p:extLst>
+      <p:ext uri="{BB962C8B-B14F-4D97-AF65-F5344CB8AC3E}">
+        <p14:creationId xmlns:p14="http://schemas.microsoft.com/office/powerpoint/2010/main" val="102700192"/>
       </p:ext>
     </p:extLst>
   </p:cSld>

</xml_diff>

<commit_message>
Added Comments and splited excerise 3 with 4 being optional
</commit_message>
<xml_diff>
--- a/Trunk/Getting Started Material/DCAF Training/5 Module Reuse.pptx
+++ b/Trunk/Getting Started Material/DCAF Training/5 Module Reuse.pptx
@@ -5,10 +5,10 @@
     <p:sldMasterId id="2147483660" r:id="rId1"/>
   </p:sldMasterIdLst>
   <p:notesMasterIdLst>
-    <p:notesMasterId r:id="rId20"/>
+    <p:notesMasterId r:id="rId26"/>
   </p:notesMasterIdLst>
   <p:sldIdLst>
-    <p:sldId id="256" r:id="rId2"/>
+    <p:sldId id="259" r:id="rId2"/>
     <p:sldId id="331" r:id="rId3"/>
     <p:sldId id="257" r:id="rId4"/>
     <p:sldId id="324" r:id="rId5"/>
@@ -18,14 +18,20 @@
     <p:sldId id="328" r:id="rId9"/>
     <p:sldId id="329" r:id="rId10"/>
     <p:sldId id="330" r:id="rId11"/>
-    <p:sldId id="333" r:id="rId12"/>
-    <p:sldId id="334" r:id="rId13"/>
-    <p:sldId id="335" r:id="rId14"/>
-    <p:sldId id="336" r:id="rId15"/>
-    <p:sldId id="332" r:id="rId16"/>
-    <p:sldId id="337" r:id="rId17"/>
-    <p:sldId id="338" r:id="rId18"/>
-    <p:sldId id="339" r:id="rId19"/>
+    <p:sldId id="340" r:id="rId12"/>
+    <p:sldId id="333" r:id="rId13"/>
+    <p:sldId id="334" r:id="rId14"/>
+    <p:sldId id="335" r:id="rId15"/>
+    <p:sldId id="336" r:id="rId16"/>
+    <p:sldId id="341" r:id="rId17"/>
+    <p:sldId id="332" r:id="rId18"/>
+    <p:sldId id="337" r:id="rId19"/>
+    <p:sldId id="338" r:id="rId20"/>
+    <p:sldId id="343" r:id="rId21"/>
+    <p:sldId id="342" r:id="rId22"/>
+    <p:sldId id="345" r:id="rId23"/>
+    <p:sldId id="346" r:id="rId24"/>
+    <p:sldId id="339" r:id="rId25"/>
   </p:sldIdLst>
   <p:sldSz cx="12192000" cy="6858000"/>
   <p:notesSz cx="6858000" cy="9144000"/>
@@ -132,6 +138,118 @@
 </p:presentation>
 </file>
 
+<file path=ppt/commentAuthors.xml><?xml version="1.0" encoding="utf-8"?>
+<p:cmAuthorLst xmlns:a="http://schemas.openxmlformats.org/drawingml/2006/main" xmlns:r="http://schemas.openxmlformats.org/officeDocument/2006/relationships" xmlns:p="http://schemas.openxmlformats.org/presentationml/2006/main">
+  <p:cmAuthor id="1" name="Benjamin Celis" initials="BC" lastIdx="5" clrIdx="0">
+    <p:extLst>
+      <p:ext uri="{19B8F6BF-5375-455C-9EA6-DF929625EA0E}">
+        <p15:presenceInfo xmlns:p15="http://schemas.microsoft.com/office/powerpoint/2012/main" userId="8099e32301af4669" providerId="Windows Live"/>
+      </p:ext>
+    </p:extLst>
+  </p:cmAuthor>
+</p:cmAuthorLst>
+</file>
+
+<file path=ppt/comments/comment1.xml><?xml version="1.0" encoding="utf-8"?>
+<p:cmLst xmlns:a="http://schemas.openxmlformats.org/drawingml/2006/main" xmlns:r="http://schemas.openxmlformats.org/officeDocument/2006/relationships" xmlns:p="http://schemas.openxmlformats.org/presentationml/2006/main">
+  <p:cm authorId="1" dt="2018-07-16T19:07:06.712" idx="4">
+    <p:pos x="642" y="1142"/>
+    <p:text>Update DIagram</p:text>
+    <p:extLst>
+      <p:ext uri="{C676402C-5697-4E1C-873F-D02D1690AC5C}">
+        <p15:threadingInfo xmlns:p15="http://schemas.microsoft.com/office/powerpoint/2012/main" timeZoneBias="300"/>
+      </p:ext>
+    </p:extLst>
+  </p:cm>
+</p:cmLst>
+</file>
+
+<file path=ppt/comments/comment2.xml><?xml version="1.0" encoding="utf-8"?>
+<p:cmLst xmlns:a="http://schemas.openxmlformats.org/drawingml/2006/main" xmlns:r="http://schemas.openxmlformats.org/officeDocument/2006/relationships" xmlns:p="http://schemas.openxmlformats.org/presentationml/2006/main">
+  <p:cm authorId="1" dt="2018-07-16T19:08:12.553" idx="5">
+    <p:pos x="662" y="873"/>
+    <p:text>Need to Update Image</p:text>
+    <p:extLst>
+      <p:ext uri="{C676402C-5697-4E1C-873F-D02D1690AC5C}">
+        <p15:threadingInfo xmlns:p15="http://schemas.microsoft.com/office/powerpoint/2012/main" timeZoneBias="300"/>
+      </p:ext>
+    </p:extLst>
+  </p:cm>
+</p:cmLst>
+</file>
+
+<file path=ppt/comments/comment3.xml><?xml version="1.0" encoding="utf-8"?>
+<p:cmLst xmlns:a="http://schemas.openxmlformats.org/drawingml/2006/main" xmlns:r="http://schemas.openxmlformats.org/officeDocument/2006/relationships" xmlns:p="http://schemas.openxmlformats.org/presentationml/2006/main">
+  <p:cm authorId="1" dt="2018-07-16T17:35:28.881" idx="1">
+    <p:pos x="10" y="10"/>
+    <p:text>Split 3 in 3 and 4 optional</p:text>
+    <p:extLst>
+      <p:ext uri="{C676402C-5697-4E1C-873F-D02D1690AC5C}">
+        <p15:threadingInfo xmlns:p15="http://schemas.microsoft.com/office/powerpoint/2012/main" timeZoneBias="300"/>
+      </p:ext>
+    </p:extLst>
+  </p:cm>
+  <p:cm authorId="1" dt="2018-07-16T17:35:53.620" idx="2">
+    <p:pos x="10" y="106"/>
+    <p:text>Make 3 in single pc , 4 split with UDP</p:text>
+    <p:extLst>
+      <p:ext uri="{C676402C-5697-4E1C-873F-D02D1690AC5C}">
+        <p15:threadingInfo xmlns:p15="http://schemas.microsoft.com/office/powerpoint/2012/main" timeZoneBias="300">
+          <p15:parentCm authorId="1" idx="1"/>
+        </p15:threadingInfo>
+      </p:ext>
+    </p:extLst>
+  </p:cm>
+  <p:cm authorId="1" dt="2018-07-16T17:40:42.132" idx="3">
+    <p:pos x="10" y="202"/>
+    <p:text>Make note on max</p:text>
+    <p:extLst>
+      <p:ext uri="{C676402C-5697-4E1C-873F-D02D1690AC5C}">
+        <p15:threadingInfo xmlns:p15="http://schemas.microsoft.com/office/powerpoint/2012/main" timeZoneBias="300">
+          <p15:parentCm authorId="1" idx="1"/>
+        </p15:threadingInfo>
+      </p:ext>
+    </p:extLst>
+  </p:cm>
+</p:cmLst>
+</file>
+
+<file path=ppt/comments/comment4.xml><?xml version="1.0" encoding="utf-8"?>
+<p:cmLst xmlns:a="http://schemas.openxmlformats.org/drawingml/2006/main" xmlns:r="http://schemas.openxmlformats.org/officeDocument/2006/relationships" xmlns:p="http://schemas.openxmlformats.org/presentationml/2006/main">
+  <p:cm authorId="1" dt="2018-07-16T17:35:28.881" idx="1">
+    <p:pos x="10" y="10"/>
+    <p:text>Split 3 in 3 and 4 optional</p:text>
+    <p:extLst>
+      <p:ext uri="{C676402C-5697-4E1C-873F-D02D1690AC5C}">
+        <p15:threadingInfo xmlns:p15="http://schemas.microsoft.com/office/powerpoint/2012/main" timeZoneBias="300"/>
+      </p:ext>
+    </p:extLst>
+  </p:cm>
+  <p:cm authorId="1" dt="2018-07-16T17:35:53.620" idx="2">
+    <p:pos x="10" y="106"/>
+    <p:text>Make 3 in single pc , 4 split with UDP</p:text>
+    <p:extLst>
+      <p:ext uri="{C676402C-5697-4E1C-873F-D02D1690AC5C}">
+        <p15:threadingInfo xmlns:p15="http://schemas.microsoft.com/office/powerpoint/2012/main" timeZoneBias="300">
+          <p15:parentCm authorId="1" idx="1"/>
+        </p15:threadingInfo>
+      </p:ext>
+    </p:extLst>
+  </p:cm>
+  <p:cm authorId="1" dt="2018-07-16T17:40:42.132" idx="3">
+    <p:pos x="10" y="202"/>
+    <p:text>Make note on max</p:text>
+    <p:extLst>
+      <p:ext uri="{C676402C-5697-4E1C-873F-D02D1690AC5C}">
+        <p15:threadingInfo xmlns:p15="http://schemas.microsoft.com/office/powerpoint/2012/main" timeZoneBias="300">
+          <p15:parentCm authorId="1" idx="1"/>
+        </p15:threadingInfo>
+      </p:ext>
+    </p:extLst>
+  </p:cm>
+</p:cmLst>
+</file>
+
 <file path=ppt/notesMasters/notesMaster1.xml><?xml version="1.0" encoding="utf-8"?>
 <p:notesMaster xmlns:a="http://schemas.openxmlformats.org/drawingml/2006/main" xmlns:r="http://schemas.openxmlformats.org/officeDocument/2006/relationships" xmlns:p="http://schemas.openxmlformats.org/presentationml/2006/main">
   <p:cSld>
@@ -214,7 +332,7 @@
           <a:p>
             <a:fld id="{6AC401AC-D3C2-4B65-ADB1-466FE56A765F}" type="datetimeFigureOut">
               <a:rPr lang="en-US" smtClean="0"/>
-              <a:t>7/3/2018</a:t>
+              <a:t>7/16/2018</a:t>
             </a:fld>
             <a:endParaRPr lang="en-US"/>
           </a:p>
@@ -752,7 +870,7 @@
           <a:p>
             <a:fld id="{7D9CDBD8-7FFA-4F3F-BD4F-ADCB5A009586}" type="slidenum">
               <a:rPr lang="en-US" smtClean="0"/>
-              <a:t>11</a:t>
+              <a:t>12</a:t>
             </a:fld>
             <a:endParaRPr lang="en-US"/>
           </a:p>
@@ -3906,7 +4024,7 @@
           <a:p>
             <a:fld id="{D1DEFE4E-FB55-4E12-ABF7-80229555E042}" type="datetimeFigureOut">
               <a:rPr lang="en-US" smtClean="0"/>
-              <a:t>7/3/2018</a:t>
+              <a:t>7/16/2018</a:t>
             </a:fld>
             <a:endParaRPr lang="en-US"/>
           </a:p>
@@ -4897,7 +5015,7 @@
           <a:p>
             <a:fld id="{D1DEFE4E-FB55-4E12-ABF7-80229555E042}" type="datetimeFigureOut">
               <a:rPr lang="en-US" smtClean="0"/>
-              <a:t>7/3/2018</a:t>
+              <a:t>7/16/2018</a:t>
             </a:fld>
             <a:endParaRPr lang="en-US"/>
           </a:p>
@@ -4961,226 +5079,6 @@
     <p:extLst>
       <p:ext uri="{BB962C8B-B14F-4D97-AF65-F5344CB8AC3E}">
         <p14:creationId xmlns:p14="http://schemas.microsoft.com/office/powerpoint/2010/main" val="987152541"/>
-      </p:ext>
-    </p:extLst>
-  </p:cSld>
-  <p:clrMapOvr>
-    <a:masterClrMapping/>
-  </p:clrMapOvr>
-</p:sldLayout>
-</file>
-
-<file path=ppt/slideLayouts/slideLayout23.xml><?xml version="1.0" encoding="utf-8"?>
-<p:sldLayout xmlns:a="http://schemas.openxmlformats.org/drawingml/2006/main" xmlns:r="http://schemas.openxmlformats.org/officeDocument/2006/relationships" xmlns:p="http://schemas.openxmlformats.org/presentationml/2006/main" type="title">
-  <p:cSld name="Title Slide">
-    <p:spTree>
-      <p:nvGrpSpPr>
-        <p:cNvPr id="1" name=""/>
-        <p:cNvGrpSpPr/>
-        <p:nvPr/>
-      </p:nvGrpSpPr>
-      <p:grpSpPr>
-        <a:xfrm>
-          <a:off x="0" y="0"/>
-          <a:ext cx="0" cy="0"/>
-          <a:chOff x="0" y="0"/>
-          <a:chExt cx="0" cy="0"/>
-        </a:xfrm>
-      </p:grpSpPr>
-      <p:sp>
-        <p:nvSpPr>
-          <p:cNvPr id="2" name="Title 1">
-            <a:extLst>
-              <a:ext uri="{FF2B5EF4-FFF2-40B4-BE49-F238E27FC236}">
-                <a16:creationId xmlns:a16="http://schemas.microsoft.com/office/drawing/2014/main" id="{7E666096-C2F8-4FEA-85F2-95EEB1C25FC8}"/>
-              </a:ext>
-            </a:extLst>
-          </p:cNvPr>
-          <p:cNvSpPr>
-            <a:spLocks noGrp="1"/>
-          </p:cNvSpPr>
-          <p:nvPr>
-            <p:ph type="ctrTitle"/>
-          </p:nvPr>
-        </p:nvSpPr>
-        <p:spPr>
-          <a:xfrm>
-            <a:off x="1524000" y="1122363"/>
-            <a:ext cx="9144000" cy="2387600"/>
-          </a:xfrm>
-        </p:spPr>
-        <p:txBody>
-          <a:bodyPr anchor="b"/>
-          <a:lstStyle>
-            <a:lvl1pPr algn="ctr">
-              <a:defRPr sz="6000"/>
-            </a:lvl1pPr>
-          </a:lstStyle>
-          <a:p>
-            <a:r>
-              <a:rPr lang="en-US"/>
-              <a:t>Click to edit Master title style</a:t>
-            </a:r>
-          </a:p>
-        </p:txBody>
-      </p:sp>
-      <p:sp>
-        <p:nvSpPr>
-          <p:cNvPr id="3" name="Subtitle 2">
-            <a:extLst>
-              <a:ext uri="{FF2B5EF4-FFF2-40B4-BE49-F238E27FC236}">
-                <a16:creationId xmlns:a16="http://schemas.microsoft.com/office/drawing/2014/main" id="{CFFBC3AA-4DA5-4BE5-B54D-DA4076EE099B}"/>
-              </a:ext>
-            </a:extLst>
-          </p:cNvPr>
-          <p:cNvSpPr>
-            <a:spLocks noGrp="1"/>
-          </p:cNvSpPr>
-          <p:nvPr>
-            <p:ph type="subTitle" idx="1"/>
-          </p:nvPr>
-        </p:nvSpPr>
-        <p:spPr>
-          <a:xfrm>
-            <a:off x="1524000" y="3602038"/>
-            <a:ext cx="9144000" cy="1655762"/>
-          </a:xfrm>
-        </p:spPr>
-        <p:txBody>
-          <a:bodyPr/>
-          <a:lstStyle>
-            <a:lvl1pPr marL="0" indent="0" algn="ctr">
-              <a:buNone/>
-              <a:defRPr sz="2400"/>
-            </a:lvl1pPr>
-            <a:lvl2pPr marL="457200" indent="0" algn="ctr">
-              <a:buNone/>
-              <a:defRPr sz="2000"/>
-            </a:lvl2pPr>
-            <a:lvl3pPr marL="914400" indent="0" algn="ctr">
-              <a:buNone/>
-              <a:defRPr sz="1800"/>
-            </a:lvl3pPr>
-            <a:lvl4pPr marL="1371600" indent="0" algn="ctr">
-              <a:buNone/>
-              <a:defRPr sz="1600"/>
-            </a:lvl4pPr>
-            <a:lvl5pPr marL="1828800" indent="0" algn="ctr">
-              <a:buNone/>
-              <a:defRPr sz="1600"/>
-            </a:lvl5pPr>
-            <a:lvl6pPr marL="2286000" indent="0" algn="ctr">
-              <a:buNone/>
-              <a:defRPr sz="1600"/>
-            </a:lvl6pPr>
-            <a:lvl7pPr marL="2743200" indent="0" algn="ctr">
-              <a:buNone/>
-              <a:defRPr sz="1600"/>
-            </a:lvl7pPr>
-            <a:lvl8pPr marL="3200400" indent="0" algn="ctr">
-              <a:buNone/>
-              <a:defRPr sz="1600"/>
-            </a:lvl8pPr>
-            <a:lvl9pPr marL="3657600" indent="0" algn="ctr">
-              <a:buNone/>
-              <a:defRPr sz="1600"/>
-            </a:lvl9pPr>
-          </a:lstStyle>
-          <a:p>
-            <a:r>
-              <a:rPr lang="en-US"/>
-              <a:t>Click to edit Master subtitle style</a:t>
-            </a:r>
-          </a:p>
-        </p:txBody>
-      </p:sp>
-      <p:sp>
-        <p:nvSpPr>
-          <p:cNvPr id="4" name="Date Placeholder 3">
-            <a:extLst>
-              <a:ext uri="{FF2B5EF4-FFF2-40B4-BE49-F238E27FC236}">
-                <a16:creationId xmlns:a16="http://schemas.microsoft.com/office/drawing/2014/main" id="{E2807504-64A9-4E82-A763-7000C31629D1}"/>
-              </a:ext>
-            </a:extLst>
-          </p:cNvPr>
-          <p:cNvSpPr>
-            <a:spLocks noGrp="1"/>
-          </p:cNvSpPr>
-          <p:nvPr>
-            <p:ph type="dt" sz="half" idx="10"/>
-          </p:nvPr>
-        </p:nvSpPr>
-        <p:spPr/>
-        <p:txBody>
-          <a:bodyPr/>
-          <a:lstStyle/>
-          <a:p>
-            <a:fld id="{D1DEFE4E-FB55-4E12-ABF7-80229555E042}" type="datetimeFigureOut">
-              <a:rPr lang="en-US" smtClean="0"/>
-              <a:t>7/3/2018</a:t>
-            </a:fld>
-            <a:endParaRPr lang="en-US"/>
-          </a:p>
-        </p:txBody>
-      </p:sp>
-      <p:sp>
-        <p:nvSpPr>
-          <p:cNvPr id="5" name="Footer Placeholder 4">
-            <a:extLst>
-              <a:ext uri="{FF2B5EF4-FFF2-40B4-BE49-F238E27FC236}">
-                <a16:creationId xmlns:a16="http://schemas.microsoft.com/office/drawing/2014/main" id="{19024C30-BFD2-4807-BF91-2B96C028AB14}"/>
-              </a:ext>
-            </a:extLst>
-          </p:cNvPr>
-          <p:cNvSpPr>
-            <a:spLocks noGrp="1"/>
-          </p:cNvSpPr>
-          <p:nvPr>
-            <p:ph type="ftr" sz="quarter" idx="11"/>
-          </p:nvPr>
-        </p:nvSpPr>
-        <p:spPr/>
-        <p:txBody>
-          <a:bodyPr/>
-          <a:lstStyle/>
-          <a:p>
-            <a:endParaRPr lang="en-US"/>
-          </a:p>
-        </p:txBody>
-      </p:sp>
-      <p:sp>
-        <p:nvSpPr>
-          <p:cNvPr id="6" name="Slide Number Placeholder 5">
-            <a:extLst>
-              <a:ext uri="{FF2B5EF4-FFF2-40B4-BE49-F238E27FC236}">
-                <a16:creationId xmlns:a16="http://schemas.microsoft.com/office/drawing/2014/main" id="{41955ACA-B77E-4632-AF01-8DE938F95CCF}"/>
-              </a:ext>
-            </a:extLst>
-          </p:cNvPr>
-          <p:cNvSpPr>
-            <a:spLocks noGrp="1"/>
-          </p:cNvSpPr>
-          <p:nvPr>
-            <p:ph type="sldNum" sz="quarter" idx="12"/>
-          </p:nvPr>
-        </p:nvSpPr>
-        <p:spPr/>
-        <p:txBody>
-          <a:bodyPr/>
-          <a:lstStyle/>
-          <a:p>
-            <a:fld id="{8AB9E4DC-EE12-43EF-A261-982C74035B5D}" type="slidenum">
-              <a:rPr lang="en-US" smtClean="0"/>
-              <a:t>‹#›</a:t>
-            </a:fld>
-            <a:endParaRPr lang="en-US"/>
-          </a:p>
-        </p:txBody>
-      </p:sp>
-    </p:spTree>
-    <p:extLst>
-      <p:ext uri="{BB962C8B-B14F-4D97-AF65-F5344CB8AC3E}">
-        <p14:creationId xmlns:p14="http://schemas.microsoft.com/office/powerpoint/2010/main" val="2483386601"/>
       </p:ext>
     </p:extLst>
   </p:cSld>
@@ -7327,7 +7225,7 @@
           <p:nvPr/>
         </p:nvPicPr>
         <p:blipFill>
-          <a:blip r:embed="rId25" cstate="screen">
+          <a:blip r:embed="rId24" cstate="screen">
             <a:extLst>
               <a:ext uri="{28A0092B-C50C-407E-A947-70E740481C1C}">
                 <a14:useLocalDpi xmlns:a14="http://schemas.microsoft.com/office/drawing/2010/main"/>
@@ -7426,7 +7324,6 @@
     <p:sldLayoutId id="2147483680" r:id="rId20"/>
     <p:sldLayoutId id="2147483681" r:id="rId21"/>
     <p:sldLayoutId id="2147483682" r:id="rId22"/>
-    <p:sldLayoutId id="2147483683" r:id="rId23"/>
   </p:sldLayoutIdLst>
   <p:txStyles>
     <p:titleStyle>
@@ -7813,13 +7710,7 @@
       </p:grpSpPr>
       <p:sp>
         <p:nvSpPr>
-          <p:cNvPr id="2" name="Title 1">
-            <a:extLst>
-              <a:ext uri="{FF2B5EF4-FFF2-40B4-BE49-F238E27FC236}">
-                <a16:creationId xmlns:a16="http://schemas.microsoft.com/office/drawing/2014/main" id="{032D7C6B-133B-45DE-B0C3-47A51D3A3385}"/>
-              </a:ext>
-            </a:extLst>
-          </p:cNvPr>
+          <p:cNvPr id="2" name="Title 1"/>
           <p:cNvSpPr>
             <a:spLocks noGrp="1"/>
           </p:cNvSpPr>
@@ -7834,20 +7725,14 @@
           <a:p>
             <a:r>
               <a:rPr lang="en-US" dirty="0"/>
-              <a:t>Module Reuse</a:t>
-            </a:r>
-          </a:p>
-        </p:txBody>
-      </p:sp>
-      <p:sp>
-        <p:nvSpPr>
-          <p:cNvPr id="3" name="Subtitle 2">
-            <a:extLst>
-              <a:ext uri="{FF2B5EF4-FFF2-40B4-BE49-F238E27FC236}">
-                <a16:creationId xmlns:a16="http://schemas.microsoft.com/office/drawing/2014/main" id="{05DED0A5-80E8-40DF-9EA5-0B04E3946032}"/>
-              </a:ext>
-            </a:extLst>
-          </p:cNvPr>
+              <a:t>Distributed Control and Automation Framework (DCAF)</a:t>
+            </a:r>
+          </a:p>
+        </p:txBody>
+      </p:sp>
+      <p:sp>
+        <p:nvSpPr>
+          <p:cNvPr id="3" name="Subtitle 2"/>
           <p:cNvSpPr>
             <a:spLocks noGrp="1"/>
           </p:cNvSpPr>
@@ -7860,14 +7745,68 @@
           <a:bodyPr/>
           <a:lstStyle/>
           <a:p>
-            <a:endParaRPr lang="en-US"/>
+            <a:r>
+              <a:rPr lang="en-US" dirty="0"/>
+              <a:t>Module Reuse</a:t>
+            </a:r>
+          </a:p>
+        </p:txBody>
+      </p:sp>
+      <p:sp>
+        <p:nvSpPr>
+          <p:cNvPr id="4" name="Text Placeholder 3"/>
+          <p:cNvSpPr>
+            <a:spLocks noGrp="1"/>
+          </p:cNvSpPr>
+          <p:nvPr>
+            <p:ph type="body" sz="quarter" idx="12"/>
+          </p:nvPr>
+        </p:nvSpPr>
+        <p:spPr/>
+        <p:txBody>
+          <a:bodyPr>
+            <a:normAutofit lnSpcReduction="10000"/>
+          </a:bodyPr>
+          <a:lstStyle/>
+          <a:p>
+            <a:r>
+              <a:rPr lang="en-US" dirty="0"/>
+              <a:t>Benjamin </a:t>
+            </a:r>
+            <a:r>
+              <a:rPr lang="en-US" dirty="0" err="1"/>
+              <a:t>Celis</a:t>
+            </a:r>
+            <a:r>
+              <a:rPr lang="en-US" dirty="0"/>
+              <a:t>, Mathew Pollock, Simon Perez</a:t>
+            </a:r>
+          </a:p>
+        </p:txBody>
+      </p:sp>
+      <p:sp>
+        <p:nvSpPr>
+          <p:cNvPr id="5" name="Text Placeholder 4"/>
+          <p:cNvSpPr>
+            <a:spLocks noGrp="1"/>
+          </p:cNvSpPr>
+          <p:nvPr>
+            <p:ph type="body" sz="quarter" idx="13"/>
+          </p:nvPr>
+        </p:nvSpPr>
+        <p:spPr/>
+        <p:txBody>
+          <a:bodyPr/>
+          <a:lstStyle/>
+          <a:p>
+            <a:endParaRPr lang="en-US" dirty="0"/>
           </a:p>
         </p:txBody>
       </p:sp>
     </p:spTree>
     <p:extLst>
       <p:ext uri="{BB962C8B-B14F-4D97-AF65-F5344CB8AC3E}">
-        <p14:creationId xmlns:p14="http://schemas.microsoft.com/office/powerpoint/2010/main" val="2967827205"/>
+        <p14:creationId xmlns:p14="http://schemas.microsoft.com/office/powerpoint/2010/main" val="3695697852"/>
       </p:ext>
     </p:extLst>
   </p:cSld>
@@ -7954,10 +7893,10 @@
       </p:grpSpPr>
       <p:sp>
         <p:nvSpPr>
-          <p:cNvPr id="2" name="Title 1">
+          <p:cNvPr id="3" name="Title 2">
             <a:extLst>
               <a:ext uri="{FF2B5EF4-FFF2-40B4-BE49-F238E27FC236}">
-                <a16:creationId xmlns:a16="http://schemas.microsoft.com/office/drawing/2014/main" id="{56983C6A-A7F6-45A6-AAEF-BEC616303276}"/>
+                <a16:creationId xmlns:a16="http://schemas.microsoft.com/office/drawing/2014/main" id="{6EA655F1-BDDC-4228-89E5-CE7E1FC58618}"/>
               </a:ext>
             </a:extLst>
           </p:cNvPr>
@@ -7975,47 +7914,61 @@
           <a:p>
             <a:r>
               <a:rPr lang="en-US" dirty="0"/>
-              <a:t>Available DCAF Module</a:t>
-            </a:r>
-          </a:p>
-        </p:txBody>
-      </p:sp>
-      <p:pic>
-        <p:nvPicPr>
-          <p:cNvPr id="5" name="Content Placeholder 4">
+              <a:t>Exercise 1</a:t>
+            </a:r>
+          </a:p>
+        </p:txBody>
+      </p:sp>
+      <p:sp>
+        <p:nvSpPr>
+          <p:cNvPr id="4" name="Content Placeholder 3">
             <a:extLst>
               <a:ext uri="{FF2B5EF4-FFF2-40B4-BE49-F238E27FC236}">
-                <a16:creationId xmlns:a16="http://schemas.microsoft.com/office/drawing/2014/main" id="{A90A4382-11DE-466F-B2EB-C93F26ADCDD3}"/>
+                <a16:creationId xmlns:a16="http://schemas.microsoft.com/office/drawing/2014/main" id="{8E6261AC-F3E4-48D9-815E-AF0E63757378}"/>
               </a:ext>
             </a:extLst>
           </p:cNvPr>
-          <p:cNvPicPr>
-            <a:picLocks noGrp="1" noChangeAspect="1"/>
-          </p:cNvPicPr>
+          <p:cNvSpPr>
+            <a:spLocks noGrp="1"/>
+          </p:cNvSpPr>
           <p:nvPr>
             <p:ph idx="1"/>
           </p:nvPr>
-        </p:nvPicPr>
-        <p:blipFill>
-          <a:blip r:embed="rId3"/>
-          <a:stretch>
-            <a:fillRect/>
-          </a:stretch>
-        </p:blipFill>
-        <p:spPr>
-          <a:xfrm>
-            <a:off x="2635362" y="974725"/>
-            <a:ext cx="6911751" cy="4897438"/>
-          </a:xfrm>
-          <a:prstGeom prst="rect">
-            <a:avLst/>
-          </a:prstGeom>
-        </p:spPr>
-      </p:pic>
+        </p:nvSpPr>
+        <p:spPr/>
+        <p:txBody>
+          <a:bodyPr/>
+          <a:lstStyle/>
+          <a:p>
+            <a:r>
+              <a:rPr lang="en-US" dirty="0"/>
+              <a:t>Create new folder</a:t>
+            </a:r>
+          </a:p>
+          <a:p>
+            <a:r>
+              <a:rPr lang="en-US" dirty="0"/>
+              <a:t>Create a execution Template</a:t>
+            </a:r>
+          </a:p>
+          <a:p>
+            <a:r>
+              <a:rPr lang="en-US" dirty="0"/>
+              <a:t>Optional Clean template</a:t>
+            </a:r>
+          </a:p>
+          <a:p>
+            <a:endParaRPr lang="en-US" dirty="0"/>
+          </a:p>
+          <a:p>
+            <a:endParaRPr lang="en-US" dirty="0"/>
+          </a:p>
+        </p:txBody>
+      </p:sp>
     </p:spTree>
     <p:extLst>
       <p:ext uri="{BB962C8B-B14F-4D97-AF65-F5344CB8AC3E}">
-        <p14:creationId xmlns:p14="http://schemas.microsoft.com/office/powerpoint/2010/main" val="75117760"/>
+        <p14:creationId xmlns:p14="http://schemas.microsoft.com/office/powerpoint/2010/main" val="1112476192"/>
       </p:ext>
     </p:extLst>
   </p:cSld>
@@ -8047,7 +8000,7 @@
           <p:cNvPr id="2" name="Title 1">
             <a:extLst>
               <a:ext uri="{FF2B5EF4-FFF2-40B4-BE49-F238E27FC236}">
-                <a16:creationId xmlns:a16="http://schemas.microsoft.com/office/drawing/2014/main" id="{B85EB323-3F30-45A2-BAA5-D5373A4BC1FD}"/>
+                <a16:creationId xmlns:a16="http://schemas.microsoft.com/office/drawing/2014/main" id="{56983C6A-A7F6-45A6-AAEF-BEC616303276}"/>
               </a:ext>
             </a:extLst>
           </p:cNvPr>
@@ -8065,17 +8018,17 @@
           <a:p>
             <a:r>
               <a:rPr lang="en-US" dirty="0"/>
-              <a:t>Available DCAF Module</a:t>
+              <a:t>Available DCAF Modules</a:t>
             </a:r>
           </a:p>
         </p:txBody>
       </p:sp>
       <p:pic>
         <p:nvPicPr>
-          <p:cNvPr id="4" name="Content Placeholder 3">
+          <p:cNvPr id="5" name="Content Placeholder 4">
             <a:extLst>
               <a:ext uri="{FF2B5EF4-FFF2-40B4-BE49-F238E27FC236}">
-                <a16:creationId xmlns:a16="http://schemas.microsoft.com/office/drawing/2014/main" id="{B4552DF6-6307-4684-998B-97A46FD1F4CB}"/>
+                <a16:creationId xmlns:a16="http://schemas.microsoft.com/office/drawing/2014/main" id="{A90A4382-11DE-466F-B2EB-C93F26ADCDD3}"/>
               </a:ext>
             </a:extLst>
           </p:cNvPr>
@@ -8087,15 +8040,15 @@
           </p:nvPr>
         </p:nvPicPr>
         <p:blipFill>
-          <a:blip r:embed="rId2"/>
+          <a:blip r:embed="rId3"/>
           <a:stretch>
             <a:fillRect/>
           </a:stretch>
         </p:blipFill>
         <p:spPr>
           <a:xfrm>
-            <a:off x="2673415" y="974725"/>
-            <a:ext cx="6835646" cy="4897438"/>
+            <a:off x="2635362" y="974725"/>
+            <a:ext cx="6911751" cy="4897438"/>
           </a:xfrm>
           <a:prstGeom prst="rect">
             <a:avLst/>
@@ -8105,7 +8058,7 @@
     </p:spTree>
     <p:extLst>
       <p:ext uri="{BB962C8B-B14F-4D97-AF65-F5344CB8AC3E}">
-        <p14:creationId xmlns:p14="http://schemas.microsoft.com/office/powerpoint/2010/main" val="3539825084"/>
+        <p14:creationId xmlns:p14="http://schemas.microsoft.com/office/powerpoint/2010/main" val="75117760"/>
       </p:ext>
     </p:extLst>
   </p:cSld>
@@ -8137,7 +8090,7 @@
           <p:cNvPr id="2" name="Title 1">
             <a:extLst>
               <a:ext uri="{FF2B5EF4-FFF2-40B4-BE49-F238E27FC236}">
-                <a16:creationId xmlns:a16="http://schemas.microsoft.com/office/drawing/2014/main" id="{03DD24FA-C02D-4EBE-9FCE-BCAD3C7D0235}"/>
+                <a16:creationId xmlns:a16="http://schemas.microsoft.com/office/drawing/2014/main" id="{B85EB323-3F30-45A2-BAA5-D5373A4BC1FD}"/>
               </a:ext>
             </a:extLst>
           </p:cNvPr>
@@ -8155,7 +8108,7 @@
           <a:p>
             <a:r>
               <a:rPr lang="en-US" dirty="0"/>
-              <a:t>Search Paths</a:t>
+              <a:t>Available DCAF Modules</a:t>
             </a:r>
           </a:p>
         </p:txBody>
@@ -8165,7 +8118,7 @@
           <p:cNvPr id="4" name="Content Placeholder 3">
             <a:extLst>
               <a:ext uri="{FF2B5EF4-FFF2-40B4-BE49-F238E27FC236}">
-                <a16:creationId xmlns:a16="http://schemas.microsoft.com/office/drawing/2014/main" id="{585A6CD5-57ED-4614-8357-60C3C9A1F854}"/>
+                <a16:creationId xmlns:a16="http://schemas.microsoft.com/office/drawing/2014/main" id="{B4552DF6-6307-4684-998B-97A46FD1F4CB}"/>
               </a:ext>
             </a:extLst>
           </p:cNvPr>
@@ -8184,8 +8137,8 @@
         </p:blipFill>
         <p:spPr>
           <a:xfrm>
-            <a:off x="1385341" y="974725"/>
-            <a:ext cx="9411794" cy="4897438"/>
+            <a:off x="2673415" y="974725"/>
+            <a:ext cx="6835646" cy="4897438"/>
           </a:xfrm>
           <a:prstGeom prst="rect">
             <a:avLst/>
@@ -8195,7 +8148,7 @@
     </p:spTree>
     <p:extLst>
       <p:ext uri="{BB962C8B-B14F-4D97-AF65-F5344CB8AC3E}">
-        <p14:creationId xmlns:p14="http://schemas.microsoft.com/office/powerpoint/2010/main" val="2054263143"/>
+        <p14:creationId xmlns:p14="http://schemas.microsoft.com/office/powerpoint/2010/main" val="3539825084"/>
       </p:ext>
     </p:extLst>
   </p:cSld>
@@ -8224,10 +8177,10 @@
       </p:grpSpPr>
       <p:sp>
         <p:nvSpPr>
-          <p:cNvPr id="4" name="Text Placeholder 3">
+          <p:cNvPr id="2" name="Title 1">
             <a:extLst>
               <a:ext uri="{FF2B5EF4-FFF2-40B4-BE49-F238E27FC236}">
-                <a16:creationId xmlns:a16="http://schemas.microsoft.com/office/drawing/2014/main" id="{8E74E8A2-5E75-4DD9-82DB-05972278D9D6}"/>
+                <a16:creationId xmlns:a16="http://schemas.microsoft.com/office/drawing/2014/main" id="{03DD24FA-C02D-4EBE-9FCE-BCAD3C7D0235}"/>
               </a:ext>
             </a:extLst>
           </p:cNvPr>
@@ -8235,7 +8188,7 @@
             <a:spLocks noGrp="1"/>
           </p:cNvSpPr>
           <p:nvPr>
-            <p:ph type="body" sz="quarter" idx="10"/>
+            <p:ph type="title"/>
           </p:nvPr>
         </p:nvSpPr>
         <p:spPr/>
@@ -8245,15 +8198,47 @@
           <a:p>
             <a:r>
               <a:rPr lang="en-US" dirty="0"/>
-              <a:t>Exercise 2</a:t>
-            </a:r>
-          </a:p>
-        </p:txBody>
-      </p:sp>
+              <a:t>Search Paths</a:t>
+            </a:r>
+          </a:p>
+        </p:txBody>
+      </p:sp>
+      <p:pic>
+        <p:nvPicPr>
+          <p:cNvPr id="4" name="Content Placeholder 3">
+            <a:extLst>
+              <a:ext uri="{FF2B5EF4-FFF2-40B4-BE49-F238E27FC236}">
+                <a16:creationId xmlns:a16="http://schemas.microsoft.com/office/drawing/2014/main" id="{585A6CD5-57ED-4614-8357-60C3C9A1F854}"/>
+              </a:ext>
+            </a:extLst>
+          </p:cNvPr>
+          <p:cNvPicPr>
+            <a:picLocks noGrp="1" noChangeAspect="1"/>
+          </p:cNvPicPr>
+          <p:nvPr>
+            <p:ph idx="1"/>
+          </p:nvPr>
+        </p:nvPicPr>
+        <p:blipFill>
+          <a:blip r:embed="rId2"/>
+          <a:stretch>
+            <a:fillRect/>
+          </a:stretch>
+        </p:blipFill>
+        <p:spPr>
+          <a:xfrm>
+            <a:off x="1385341" y="974725"/>
+            <a:ext cx="9411794" cy="4897438"/>
+          </a:xfrm>
+          <a:prstGeom prst="rect">
+            <a:avLst/>
+          </a:prstGeom>
+        </p:spPr>
+      </p:pic>
     </p:spTree>
     <p:extLst>
       <p:ext uri="{BB962C8B-B14F-4D97-AF65-F5344CB8AC3E}">
-        <p14:creationId xmlns:p14="http://schemas.microsoft.com/office/powerpoint/2010/main" val="2557804420"/>
+        <p14:creationId xmlns:p14="http://schemas.microsoft.com/office/powerpoint/2010/main" val="2054263143"/>
       </p:ext>
     </p:extLst>
   </p:cSld>
@@ -8282,82 +8267,36 @@
       </p:grpSpPr>
       <p:sp>
         <p:nvSpPr>
-          <p:cNvPr id="2" name="Title 1"/>
-          <p:cNvSpPr>
-            <a:spLocks noGrp="1"/>
-          </p:cNvSpPr>
-          <p:nvPr>
-            <p:ph type="title"/>
-          </p:nvPr>
-        </p:nvSpPr>
-        <p:spPr/>
-        <p:txBody>
-          <a:bodyPr/>
-          <a:lstStyle/>
-          <a:p>
-            <a:r>
-              <a:rPr lang="en-US" dirty="0"/>
-              <a:t> What type of module do I need</a:t>
-            </a:r>
-          </a:p>
-        </p:txBody>
-      </p:sp>
-      <p:sp>
-        <p:nvSpPr>
-          <p:cNvPr id="3" name="Content Placeholder 2"/>
-          <p:cNvSpPr>
-            <a:spLocks noGrp="1"/>
-          </p:cNvSpPr>
-          <p:nvPr>
-            <p:ph idx="1"/>
-          </p:nvPr>
-        </p:nvSpPr>
-        <p:spPr/>
-        <p:txBody>
-          <a:bodyPr/>
-          <a:lstStyle/>
-          <a:p>
-            <a:endParaRPr lang="en-US" dirty="0"/>
-          </a:p>
-          <a:p>
-            <a:endParaRPr lang="en-US" dirty="0"/>
-          </a:p>
-        </p:txBody>
-      </p:sp>
-      <p:pic>
-        <p:nvPicPr>
-          <p:cNvPr id="6" name="Picture 5">
+          <p:cNvPr id="4" name="Text Placeholder 3">
             <a:extLst>
               <a:ext uri="{FF2B5EF4-FFF2-40B4-BE49-F238E27FC236}">
-                <a16:creationId xmlns:a16="http://schemas.microsoft.com/office/drawing/2014/main" id="{020D13B5-AA7C-40F4-804E-4430A96880F4}"/>
+                <a16:creationId xmlns:a16="http://schemas.microsoft.com/office/drawing/2014/main" id="{8E74E8A2-5E75-4DD9-82DB-05972278D9D6}"/>
               </a:ext>
             </a:extLst>
           </p:cNvPr>
-          <p:cNvPicPr>
-            <a:picLocks noChangeAspect="1"/>
-          </p:cNvPicPr>
-          <p:nvPr/>
-        </p:nvPicPr>
-        <p:blipFill>
-          <a:blip r:embed="rId2"/>
-          <a:stretch>
-            <a:fillRect/>
-          </a:stretch>
-        </p:blipFill>
-        <p:spPr>
-          <a:xfrm>
-            <a:off x="1113453" y="1158632"/>
-            <a:ext cx="9558780" cy="4996462"/>
-          </a:xfrm>
-          <a:prstGeom prst="rect">
-            <a:avLst/>
-          </a:prstGeom>
-        </p:spPr>
-      </p:pic>
+          <p:cNvSpPr>
+            <a:spLocks noGrp="1"/>
+          </p:cNvSpPr>
+          <p:nvPr>
+            <p:ph type="body" sz="quarter" idx="10"/>
+          </p:nvPr>
+        </p:nvSpPr>
+        <p:spPr/>
+        <p:txBody>
+          <a:bodyPr/>
+          <a:lstStyle/>
+          <a:p>
+            <a:r>
+              <a:rPr lang="en-US" dirty="0"/>
+              <a:t>Exercise 2</a:t>
+            </a:r>
+          </a:p>
+        </p:txBody>
+      </p:sp>
     </p:spTree>
     <p:extLst>
       <p:ext uri="{BB962C8B-B14F-4D97-AF65-F5344CB8AC3E}">
-        <p14:creationId xmlns:p14="http://schemas.microsoft.com/office/powerpoint/2010/main" val="1652348957"/>
+        <p14:creationId xmlns:p14="http://schemas.microsoft.com/office/powerpoint/2010/main" val="2557804420"/>
       </p:ext>
     </p:extLst>
   </p:cSld>
@@ -8386,10 +8325,10 @@
       </p:grpSpPr>
       <p:sp>
         <p:nvSpPr>
-          <p:cNvPr id="2" name="Title 1">
+          <p:cNvPr id="3" name="Title 2">
             <a:extLst>
               <a:ext uri="{FF2B5EF4-FFF2-40B4-BE49-F238E27FC236}">
-                <a16:creationId xmlns:a16="http://schemas.microsoft.com/office/drawing/2014/main" id="{E2FFB8DF-E381-441C-AB33-0AB0CD6CDD29}"/>
+                <a16:creationId xmlns:a16="http://schemas.microsoft.com/office/drawing/2014/main" id="{757DFDB5-71E0-442C-B3ED-7EA042C4EB36}"/>
               </a:ext>
             </a:extLst>
           </p:cNvPr>
@@ -8406,18 +8345,22 @@
           <a:lstStyle/>
           <a:p>
             <a:r>
-              <a:rPr lang="en-US" dirty="0"/>
-              <a:t>Script Includes</a:t>
-            </a:r>
-          </a:p>
-        </p:txBody>
-      </p:sp>
-      <p:sp>
-        <p:nvSpPr>
-          <p:cNvPr id="3" name="Content Placeholder 2">
+              <a:rPr lang="en-US" dirty="0" err="1"/>
+              <a:t>Excerise</a:t>
+            </a:r>
+            <a:r>
+              <a:rPr lang="en-US" dirty="0"/>
+              <a:t> 2</a:t>
+            </a:r>
+          </a:p>
+        </p:txBody>
+      </p:sp>
+      <p:sp>
+        <p:nvSpPr>
+          <p:cNvPr id="4" name="Content Placeholder 3">
             <a:extLst>
               <a:ext uri="{FF2B5EF4-FFF2-40B4-BE49-F238E27FC236}">
-                <a16:creationId xmlns:a16="http://schemas.microsoft.com/office/drawing/2014/main" id="{5DD0D945-60E8-43F2-BE43-384B4E3DCB56}"/>
+                <a16:creationId xmlns:a16="http://schemas.microsoft.com/office/drawing/2014/main" id="{7A48CA6C-F59B-4657-A3A8-D6DCFECF8CDB}"/>
               </a:ext>
             </a:extLst>
           </p:cNvPr>
@@ -8435,50 +8378,26 @@
           <a:p>
             <a:r>
               <a:rPr lang="en-US" dirty="0"/>
-              <a:t>You should run this every time you add new modules to the configuration</a:t>
-            </a:r>
-          </a:p>
-          <a:p>
-            <a:r>
-              <a:rPr lang="en-US" dirty="0"/>
-              <a:t>It updates the includes VI</a:t>
-            </a:r>
-          </a:p>
-        </p:txBody>
-      </p:sp>
-      <p:pic>
-        <p:nvPicPr>
-          <p:cNvPr id="6" name="Picture Placeholder 5">
-            <a:extLst>
-              <a:ext uri="{FF2B5EF4-FFF2-40B4-BE49-F238E27FC236}">
-                <a16:creationId xmlns:a16="http://schemas.microsoft.com/office/drawing/2014/main" id="{03268D42-02C0-4EB4-93DB-F2491F854F54}"/>
-              </a:ext>
-            </a:extLst>
-          </p:cNvPr>
-          <p:cNvPicPr>
-            <a:picLocks noGrp="1" noChangeAspect="1"/>
-          </p:cNvPicPr>
-          <p:nvPr>
-            <p:ph type="pic" sz="quarter" idx="10"/>
-          </p:nvPr>
-        </p:nvPicPr>
-        <p:blipFill>
-          <a:blip r:embed="rId2"/>
-          <a:srcRect l="3936" r="3936"/>
-          <a:stretch>
-            <a:fillRect/>
-          </a:stretch>
-        </p:blipFill>
-        <p:spPr>
-          <a:prstGeom prst="rect">
-            <a:avLst/>
-          </a:prstGeom>
-        </p:spPr>
-      </p:pic>
+              <a:t>Add Examples Path</a:t>
+            </a:r>
+          </a:p>
+          <a:p>
+            <a:r>
+              <a:rPr lang="en-US" dirty="0"/>
+              <a:t>/LabVIEW / Examples/ </a:t>
+            </a:r>
+            <a:r>
+              <a:rPr lang="en-US" dirty="0" err="1"/>
+              <a:t>Dcaf</a:t>
+            </a:r>
+            <a:endParaRPr lang="en-US" dirty="0"/>
+          </a:p>
+        </p:txBody>
+      </p:sp>
     </p:spTree>
     <p:extLst>
       <p:ext uri="{BB962C8B-B14F-4D97-AF65-F5344CB8AC3E}">
-        <p14:creationId xmlns:p14="http://schemas.microsoft.com/office/powerpoint/2010/main" val="3075195045"/>
+        <p14:creationId xmlns:p14="http://schemas.microsoft.com/office/powerpoint/2010/main" val="1454115867"/>
       </p:ext>
     </p:extLst>
   </p:cSld>
@@ -8507,47 +8426,61 @@
       </p:grpSpPr>
       <p:sp>
         <p:nvSpPr>
-          <p:cNvPr id="2" name="Title 1">
+          <p:cNvPr id="2" name="Title 1"/>
+          <p:cNvSpPr>
+            <a:spLocks noGrp="1"/>
+          </p:cNvSpPr>
+          <p:nvPr>
+            <p:ph type="title"/>
+          </p:nvPr>
+        </p:nvSpPr>
+        <p:spPr/>
+        <p:txBody>
+          <a:bodyPr/>
+          <a:lstStyle/>
+          <a:p>
+            <a:r>
+              <a:rPr lang="en-US" dirty="0"/>
+              <a:t> What type of module do I need</a:t>
+            </a:r>
+          </a:p>
+        </p:txBody>
+      </p:sp>
+      <p:sp>
+        <p:nvSpPr>
+          <p:cNvPr id="3" name="Content Placeholder 2"/>
+          <p:cNvSpPr>
+            <a:spLocks noGrp="1"/>
+          </p:cNvSpPr>
+          <p:nvPr>
+            <p:ph sz="half" idx="1"/>
+          </p:nvPr>
+        </p:nvSpPr>
+        <p:spPr/>
+        <p:txBody>
+          <a:bodyPr/>
+          <a:lstStyle/>
+          <a:p>
+            <a:endParaRPr lang="en-US" dirty="0"/>
+          </a:p>
+          <a:p>
+            <a:endParaRPr lang="en-US" dirty="0"/>
+          </a:p>
+        </p:txBody>
+      </p:sp>
+      <p:pic>
+        <p:nvPicPr>
+          <p:cNvPr id="6" name="Picture 5">
             <a:extLst>
               <a:ext uri="{FF2B5EF4-FFF2-40B4-BE49-F238E27FC236}">
-                <a16:creationId xmlns:a16="http://schemas.microsoft.com/office/drawing/2014/main" id="{81313DE9-2E81-41C4-918F-86875267B812}"/>
-              </a:ext>
-            </a:extLst>
-          </p:cNvPr>
-          <p:cNvSpPr>
-            <a:spLocks noGrp="1"/>
-          </p:cNvSpPr>
-          <p:nvPr>
-            <p:ph type="title"/>
-          </p:nvPr>
-        </p:nvSpPr>
-        <p:spPr/>
-        <p:txBody>
-          <a:bodyPr/>
-          <a:lstStyle/>
-          <a:p>
-            <a:r>
-              <a:rPr lang="en-US" dirty="0"/>
-              <a:t>Deployment</a:t>
-            </a:r>
-          </a:p>
-        </p:txBody>
-      </p:sp>
-      <p:pic>
-        <p:nvPicPr>
-          <p:cNvPr id="4" name="Content Placeholder 3">
-            <a:extLst>
-              <a:ext uri="{FF2B5EF4-FFF2-40B4-BE49-F238E27FC236}">
-                <a16:creationId xmlns:a16="http://schemas.microsoft.com/office/drawing/2014/main" id="{32DCC058-3C23-4A90-B2A3-8BDAD603EA76}"/>
+                <a16:creationId xmlns:a16="http://schemas.microsoft.com/office/drawing/2014/main" id="{020D13B5-AA7C-40F4-804E-4430A96880F4}"/>
               </a:ext>
             </a:extLst>
           </p:cNvPr>
           <p:cNvPicPr>
-            <a:picLocks noGrp="1" noChangeAspect="1"/>
+            <a:picLocks noChangeAspect="1"/>
           </p:cNvPicPr>
-          <p:nvPr>
-            <p:ph idx="1"/>
-          </p:nvPr>
+          <p:nvPr/>
         </p:nvPicPr>
         <p:blipFill>
           <a:blip r:embed="rId2"/>
@@ -8557,8 +8490,8 @@
         </p:blipFill>
         <p:spPr>
           <a:xfrm>
-            <a:off x="2559977" y="974725"/>
-            <a:ext cx="7062521" cy="4897438"/>
+            <a:off x="1113453" y="1158632"/>
+            <a:ext cx="9558780" cy="4996462"/>
           </a:xfrm>
           <a:prstGeom prst="rect">
             <a:avLst/>
@@ -8568,7 +8501,7 @@
     </p:spTree>
     <p:extLst>
       <p:ext uri="{BB962C8B-B14F-4D97-AF65-F5344CB8AC3E}">
-        <p14:creationId xmlns:p14="http://schemas.microsoft.com/office/powerpoint/2010/main" val="433068583"/>
+        <p14:creationId xmlns:p14="http://schemas.microsoft.com/office/powerpoint/2010/main" val="1652348957"/>
       </p:ext>
     </p:extLst>
   </p:cSld>
@@ -8600,7 +8533,7 @@
           <p:cNvPr id="2" name="Title 1">
             <a:extLst>
               <a:ext uri="{FF2B5EF4-FFF2-40B4-BE49-F238E27FC236}">
-                <a16:creationId xmlns:a16="http://schemas.microsoft.com/office/drawing/2014/main" id="{899A3CB7-10EE-4C09-BEEF-18D2CEF0113E}"/>
+                <a16:creationId xmlns:a16="http://schemas.microsoft.com/office/drawing/2014/main" id="{E2FFB8DF-E381-441C-AB33-0AB0CD6CDD29}"/>
               </a:ext>
             </a:extLst>
           </p:cNvPr>
@@ -8618,7 +8551,7 @@
           <a:p>
             <a:r>
               <a:rPr lang="en-US" dirty="0"/>
-              <a:t>Conclusion</a:t>
+              <a:t>Script Includes</a:t>
             </a:r>
           </a:p>
         </p:txBody>
@@ -8628,7 +8561,7 @@
           <p:cNvPr id="3" name="Content Placeholder 2">
             <a:extLst>
               <a:ext uri="{FF2B5EF4-FFF2-40B4-BE49-F238E27FC236}">
-                <a16:creationId xmlns:a16="http://schemas.microsoft.com/office/drawing/2014/main" id="{6A4767EB-4F86-42AD-AE97-F7C0EC2E2A84}"/>
+                <a16:creationId xmlns:a16="http://schemas.microsoft.com/office/drawing/2014/main" id="{5DD0D945-60E8-43F2-BE43-384B4E3DCB56}"/>
               </a:ext>
             </a:extLst>
           </p:cNvPr>
@@ -8636,7 +8569,7 @@
             <a:spLocks noGrp="1"/>
           </p:cNvSpPr>
           <p:nvPr>
-            <p:ph idx="1"/>
+            <p:ph sz="half" idx="1"/>
           </p:nvPr>
         </p:nvSpPr>
         <p:spPr/>
@@ -8646,54 +8579,143 @@
           <a:p>
             <a:r>
               <a:rPr lang="en-US" dirty="0"/>
-              <a:t>Before creating modules check available modules</a:t>
-            </a:r>
-          </a:p>
-          <a:p>
-            <a:r>
-              <a:rPr lang="en-US" dirty="0"/>
-              <a:t>Choose the right execution template</a:t>
-            </a:r>
-          </a:p>
-          <a:p>
-            <a:r>
-              <a:rPr lang="en-US" dirty="0"/>
-              <a:t>Create the configuration</a:t>
-            </a:r>
-          </a:p>
-          <a:p>
-            <a:r>
-              <a:rPr lang="en-US" dirty="0"/>
-              <a:t>Update include VIs</a:t>
-            </a:r>
-          </a:p>
-          <a:p>
-            <a:r>
-              <a:rPr lang="en-US" dirty="0"/>
-              <a:t>Deploy Configuration</a:t>
-            </a:r>
-          </a:p>
-          <a:p>
-            <a:endParaRPr lang="en-US" dirty="0"/>
-          </a:p>
-          <a:p>
-            <a:r>
-              <a:rPr lang="en-US" dirty="0"/>
-              <a:t>Most likely you will need at least 1 custom module most likely a static module and that is cover on the next session</a:t>
-            </a:r>
-          </a:p>
-          <a:p>
-            <a:endParaRPr lang="en-US" dirty="0"/>
-          </a:p>
-          <a:p>
-            <a:endParaRPr lang="en-US" dirty="0"/>
-          </a:p>
-        </p:txBody>
-      </p:sp>
+              <a:t>You should run this every time you add new modules to the configuration</a:t>
+            </a:r>
+          </a:p>
+          <a:p>
+            <a:r>
+              <a:rPr lang="en-US" dirty="0"/>
+              <a:t>It updates the includes VI</a:t>
+            </a:r>
+          </a:p>
+        </p:txBody>
+      </p:sp>
+      <p:pic>
+        <p:nvPicPr>
+          <p:cNvPr id="6" name="Picture Placeholder 5">
+            <a:extLst>
+              <a:ext uri="{FF2B5EF4-FFF2-40B4-BE49-F238E27FC236}">
+                <a16:creationId xmlns:a16="http://schemas.microsoft.com/office/drawing/2014/main" id="{03268D42-02C0-4EB4-93DB-F2491F854F54}"/>
+              </a:ext>
+            </a:extLst>
+          </p:cNvPr>
+          <p:cNvPicPr>
+            <a:picLocks noGrp="1" noChangeAspect="1"/>
+          </p:cNvPicPr>
+          <p:nvPr>
+            <p:ph sz="half" idx="2"/>
+          </p:nvPr>
+        </p:nvPicPr>
+        <p:blipFill>
+          <a:blip r:embed="rId2"/>
+          <a:stretch>
+            <a:fillRect/>
+          </a:stretch>
+        </p:blipFill>
+        <p:spPr>
+          <a:xfrm>
+            <a:off x="6851330" y="974725"/>
+            <a:ext cx="4082102" cy="5202238"/>
+          </a:xfrm>
+          <a:prstGeom prst="rect">
+            <a:avLst/>
+          </a:prstGeom>
+        </p:spPr>
+      </p:pic>
     </p:spTree>
     <p:extLst>
       <p:ext uri="{BB962C8B-B14F-4D97-AF65-F5344CB8AC3E}">
-        <p14:creationId xmlns:p14="http://schemas.microsoft.com/office/powerpoint/2010/main" val="869522824"/>
+        <p14:creationId xmlns:p14="http://schemas.microsoft.com/office/powerpoint/2010/main" val="3075195045"/>
+      </p:ext>
+    </p:extLst>
+  </p:cSld>
+  <p:clrMapOvr>
+    <a:masterClrMapping/>
+  </p:clrMapOvr>
+</p:sld>
+</file>
+
+<file path=ppt/slides/slide19.xml><?xml version="1.0" encoding="utf-8"?>
+<p:sld xmlns:a="http://schemas.openxmlformats.org/drawingml/2006/main" xmlns:r="http://schemas.openxmlformats.org/officeDocument/2006/relationships" xmlns:p="http://schemas.openxmlformats.org/presentationml/2006/main">
+  <p:cSld>
+    <p:spTree>
+      <p:nvGrpSpPr>
+        <p:cNvPr id="1" name=""/>
+        <p:cNvGrpSpPr/>
+        <p:nvPr/>
+      </p:nvGrpSpPr>
+      <p:grpSpPr>
+        <a:xfrm>
+          <a:off x="0" y="0"/>
+          <a:ext cx="0" cy="0"/>
+          <a:chOff x="0" y="0"/>
+          <a:chExt cx="0" cy="0"/>
+        </a:xfrm>
+      </p:grpSpPr>
+      <p:sp>
+        <p:nvSpPr>
+          <p:cNvPr id="2" name="Title 1">
+            <a:extLst>
+              <a:ext uri="{FF2B5EF4-FFF2-40B4-BE49-F238E27FC236}">
+                <a16:creationId xmlns:a16="http://schemas.microsoft.com/office/drawing/2014/main" id="{81313DE9-2E81-41C4-918F-86875267B812}"/>
+              </a:ext>
+            </a:extLst>
+          </p:cNvPr>
+          <p:cNvSpPr>
+            <a:spLocks noGrp="1"/>
+          </p:cNvSpPr>
+          <p:nvPr>
+            <p:ph type="title"/>
+          </p:nvPr>
+        </p:nvSpPr>
+        <p:spPr/>
+        <p:txBody>
+          <a:bodyPr/>
+          <a:lstStyle/>
+          <a:p>
+            <a:r>
+              <a:rPr lang="en-US" dirty="0"/>
+              <a:t>Deployment</a:t>
+            </a:r>
+          </a:p>
+        </p:txBody>
+      </p:sp>
+      <p:pic>
+        <p:nvPicPr>
+          <p:cNvPr id="4" name="Content Placeholder 3">
+            <a:extLst>
+              <a:ext uri="{FF2B5EF4-FFF2-40B4-BE49-F238E27FC236}">
+                <a16:creationId xmlns:a16="http://schemas.microsoft.com/office/drawing/2014/main" id="{32DCC058-3C23-4A90-B2A3-8BDAD603EA76}"/>
+              </a:ext>
+            </a:extLst>
+          </p:cNvPr>
+          <p:cNvPicPr>
+            <a:picLocks noGrp="1" noChangeAspect="1"/>
+          </p:cNvPicPr>
+          <p:nvPr>
+            <p:ph idx="1"/>
+          </p:nvPr>
+        </p:nvPicPr>
+        <p:blipFill>
+          <a:blip r:embed="rId2"/>
+          <a:stretch>
+            <a:fillRect/>
+          </a:stretch>
+        </p:blipFill>
+        <p:spPr>
+          <a:xfrm>
+            <a:off x="2559977" y="974725"/>
+            <a:ext cx="7062521" cy="4897438"/>
+          </a:xfrm>
+          <a:prstGeom prst="rect">
+            <a:avLst/>
+          </a:prstGeom>
+        </p:spPr>
+      </p:pic>
+    </p:spTree>
+    <p:extLst>
+      <p:ext uri="{BB962C8B-B14F-4D97-AF65-F5344CB8AC3E}">
+        <p14:creationId xmlns:p14="http://schemas.microsoft.com/office/powerpoint/2010/main" val="433068583"/>
       </p:ext>
     </p:extLst>
   </p:cSld>
@@ -8816,6 +8838,537 @@
 </p:sld>
 </file>
 
+<file path=ppt/slides/slide20.xml><?xml version="1.0" encoding="utf-8"?>
+<p:sld xmlns:a="http://schemas.openxmlformats.org/drawingml/2006/main" xmlns:r="http://schemas.openxmlformats.org/officeDocument/2006/relationships" xmlns:p="http://schemas.openxmlformats.org/presentationml/2006/main">
+  <p:cSld>
+    <p:spTree>
+      <p:nvGrpSpPr>
+        <p:cNvPr id="1" name=""/>
+        <p:cNvGrpSpPr/>
+        <p:nvPr/>
+      </p:nvGrpSpPr>
+      <p:grpSpPr>
+        <a:xfrm>
+          <a:off x="0" y="0"/>
+          <a:ext cx="0" cy="0"/>
+          <a:chOff x="0" y="0"/>
+          <a:chExt cx="0" cy="0"/>
+        </a:xfrm>
+      </p:grpSpPr>
+      <p:sp>
+        <p:nvSpPr>
+          <p:cNvPr id="4" name="Text Placeholder 3">
+            <a:extLst>
+              <a:ext uri="{FF2B5EF4-FFF2-40B4-BE49-F238E27FC236}">
+                <a16:creationId xmlns:a16="http://schemas.microsoft.com/office/drawing/2014/main" id="{8E74E8A2-5E75-4DD9-82DB-05972278D9D6}"/>
+              </a:ext>
+            </a:extLst>
+          </p:cNvPr>
+          <p:cNvSpPr>
+            <a:spLocks noGrp="1"/>
+          </p:cNvSpPr>
+          <p:nvPr>
+            <p:ph type="body" sz="quarter" idx="10"/>
+          </p:nvPr>
+        </p:nvSpPr>
+        <p:spPr/>
+        <p:txBody>
+          <a:bodyPr/>
+          <a:lstStyle/>
+          <a:p>
+            <a:r>
+              <a:rPr lang="en-US" dirty="0"/>
+              <a:t>Exercise 3</a:t>
+            </a:r>
+          </a:p>
+        </p:txBody>
+      </p:sp>
+    </p:spTree>
+    <p:extLst>
+      <p:ext uri="{BB962C8B-B14F-4D97-AF65-F5344CB8AC3E}">
+        <p14:creationId xmlns:p14="http://schemas.microsoft.com/office/powerpoint/2010/main" val="2432412840"/>
+      </p:ext>
+    </p:extLst>
+  </p:cSld>
+  <p:clrMapOvr>
+    <a:masterClrMapping/>
+  </p:clrMapOvr>
+</p:sld>
+</file>
+
+<file path=ppt/slides/slide21.xml><?xml version="1.0" encoding="utf-8"?>
+<p:sld xmlns:a="http://schemas.openxmlformats.org/drawingml/2006/main" xmlns:r="http://schemas.openxmlformats.org/officeDocument/2006/relationships" xmlns:p="http://schemas.openxmlformats.org/presentationml/2006/main">
+  <p:cSld>
+    <p:spTree>
+      <p:nvGrpSpPr>
+        <p:cNvPr id="1" name=""/>
+        <p:cNvGrpSpPr/>
+        <p:nvPr/>
+      </p:nvGrpSpPr>
+      <p:grpSpPr>
+        <a:xfrm>
+          <a:off x="0" y="0"/>
+          <a:ext cx="0" cy="0"/>
+          <a:chOff x="0" y="0"/>
+          <a:chExt cx="0" cy="0"/>
+        </a:xfrm>
+      </p:grpSpPr>
+      <p:pic>
+        <p:nvPicPr>
+          <p:cNvPr id="6" name="Picture 5">
+            <a:extLst>
+              <a:ext uri="{FF2B5EF4-FFF2-40B4-BE49-F238E27FC236}">
+                <a16:creationId xmlns:a16="http://schemas.microsoft.com/office/drawing/2014/main" id="{CB441A22-18D6-4F9A-A321-680798C5965C}"/>
+              </a:ext>
+            </a:extLst>
+          </p:cNvPr>
+          <p:cNvPicPr>
+            <a:picLocks noChangeAspect="1"/>
+          </p:cNvPicPr>
+          <p:nvPr/>
+        </p:nvPicPr>
+        <p:blipFill>
+          <a:blip r:embed="rId2"/>
+          <a:stretch>
+            <a:fillRect/>
+          </a:stretch>
+        </p:blipFill>
+        <p:spPr>
+          <a:xfrm>
+            <a:off x="1017043" y="1658788"/>
+            <a:ext cx="11230096" cy="3869482"/>
+          </a:xfrm>
+          <a:prstGeom prst="rect">
+            <a:avLst/>
+          </a:prstGeom>
+        </p:spPr>
+      </p:pic>
+      <p:sp>
+        <p:nvSpPr>
+          <p:cNvPr id="2" name="Title 1">
+            <a:extLst>
+              <a:ext uri="{FF2B5EF4-FFF2-40B4-BE49-F238E27FC236}">
+                <a16:creationId xmlns:a16="http://schemas.microsoft.com/office/drawing/2014/main" id="{28EE2FDC-A3BB-4B4E-B8B0-C2B1BF07261A}"/>
+              </a:ext>
+            </a:extLst>
+          </p:cNvPr>
+          <p:cNvSpPr>
+            <a:spLocks noGrp="1"/>
+          </p:cNvSpPr>
+          <p:nvPr>
+            <p:ph type="title"/>
+          </p:nvPr>
+        </p:nvSpPr>
+        <p:spPr/>
+        <p:txBody>
+          <a:bodyPr/>
+          <a:lstStyle/>
+          <a:p>
+            <a:r>
+              <a:rPr lang="en-US" dirty="0"/>
+              <a:t>Exercise 3</a:t>
+            </a:r>
+          </a:p>
+        </p:txBody>
+      </p:sp>
+      <p:sp>
+        <p:nvSpPr>
+          <p:cNvPr id="5" name="Content Placeholder 4">
+            <a:extLst>
+              <a:ext uri="{FF2B5EF4-FFF2-40B4-BE49-F238E27FC236}">
+                <a16:creationId xmlns:a16="http://schemas.microsoft.com/office/drawing/2014/main" id="{84CCE329-81ED-40EE-974D-568691E4A576}"/>
+              </a:ext>
+            </a:extLst>
+          </p:cNvPr>
+          <p:cNvSpPr>
+            <a:spLocks noGrp="1"/>
+          </p:cNvSpPr>
+          <p:nvPr>
+            <p:ph idx="1"/>
+          </p:nvPr>
+        </p:nvSpPr>
+        <p:spPr/>
+        <p:txBody>
+          <a:bodyPr/>
+          <a:lstStyle/>
+          <a:p>
+            <a:r>
+              <a:rPr lang="en-US" dirty="0"/>
+              <a:t>Add Engine</a:t>
+            </a:r>
+          </a:p>
+          <a:p>
+            <a:r>
+              <a:rPr lang="en-US" dirty="0"/>
+              <a:t>Add Modules</a:t>
+            </a:r>
+          </a:p>
+          <a:p>
+            <a:r>
+              <a:rPr lang="en-US" dirty="0"/>
+              <a:t>Map Modules</a:t>
+            </a:r>
+          </a:p>
+          <a:p>
+            <a:r>
+              <a:rPr lang="en-US" dirty="0"/>
+              <a:t>Script Includes</a:t>
+            </a:r>
+          </a:p>
+          <a:p>
+            <a:r>
+              <a:rPr lang="en-US" dirty="0"/>
+              <a:t>Add UI to main</a:t>
+            </a:r>
+          </a:p>
+          <a:p>
+            <a:r>
+              <a:rPr lang="en-US" dirty="0"/>
+              <a:t>Run Code</a:t>
+            </a:r>
+          </a:p>
+        </p:txBody>
+      </p:sp>
+    </p:spTree>
+    <p:extLst>
+      <p:ext uri="{BB962C8B-B14F-4D97-AF65-F5344CB8AC3E}">
+        <p14:creationId xmlns:p14="http://schemas.microsoft.com/office/powerpoint/2010/main" val="2956376815"/>
+      </p:ext>
+    </p:extLst>
+  </p:cSld>
+  <p:clrMapOvr>
+    <a:masterClrMapping/>
+  </p:clrMapOvr>
+</p:sld>
+</file>
+
+<file path=ppt/slides/slide22.xml><?xml version="1.0" encoding="utf-8"?>
+<p:sld xmlns:a="http://schemas.openxmlformats.org/drawingml/2006/main" xmlns:r="http://schemas.openxmlformats.org/officeDocument/2006/relationships" xmlns:p="http://schemas.openxmlformats.org/presentationml/2006/main">
+  <p:cSld>
+    <p:spTree>
+      <p:nvGrpSpPr>
+        <p:cNvPr id="1" name=""/>
+        <p:cNvGrpSpPr/>
+        <p:nvPr/>
+      </p:nvGrpSpPr>
+      <p:grpSpPr>
+        <a:xfrm>
+          <a:off x="0" y="0"/>
+          <a:ext cx="0" cy="0"/>
+          <a:chOff x="0" y="0"/>
+          <a:chExt cx="0" cy="0"/>
+        </a:xfrm>
+      </p:grpSpPr>
+      <p:sp>
+        <p:nvSpPr>
+          <p:cNvPr id="4" name="Text Placeholder 3">
+            <a:extLst>
+              <a:ext uri="{FF2B5EF4-FFF2-40B4-BE49-F238E27FC236}">
+                <a16:creationId xmlns:a16="http://schemas.microsoft.com/office/drawing/2014/main" id="{8E74E8A2-5E75-4DD9-82DB-05972278D9D6}"/>
+              </a:ext>
+            </a:extLst>
+          </p:cNvPr>
+          <p:cNvSpPr>
+            <a:spLocks noGrp="1"/>
+          </p:cNvSpPr>
+          <p:nvPr>
+            <p:ph type="body" sz="quarter" idx="10"/>
+          </p:nvPr>
+        </p:nvSpPr>
+        <p:spPr/>
+        <p:txBody>
+          <a:bodyPr/>
+          <a:lstStyle/>
+          <a:p>
+            <a:r>
+              <a:rPr lang="en-US" dirty="0"/>
+              <a:t>Exercise 4</a:t>
+            </a:r>
+          </a:p>
+          <a:p>
+            <a:r>
+              <a:rPr lang="en-US"/>
+              <a:t>Optional</a:t>
+            </a:r>
+            <a:endParaRPr lang="en-US" dirty="0"/>
+          </a:p>
+        </p:txBody>
+      </p:sp>
+    </p:spTree>
+    <p:extLst>
+      <p:ext uri="{BB962C8B-B14F-4D97-AF65-F5344CB8AC3E}">
+        <p14:creationId xmlns:p14="http://schemas.microsoft.com/office/powerpoint/2010/main" val="4023779042"/>
+      </p:ext>
+    </p:extLst>
+  </p:cSld>
+  <p:clrMapOvr>
+    <a:masterClrMapping/>
+  </p:clrMapOvr>
+</p:sld>
+</file>
+
+<file path=ppt/slides/slide23.xml><?xml version="1.0" encoding="utf-8"?>
+<p:sld xmlns:a="http://schemas.openxmlformats.org/drawingml/2006/main" xmlns:r="http://schemas.openxmlformats.org/officeDocument/2006/relationships" xmlns:p="http://schemas.openxmlformats.org/presentationml/2006/main">
+  <p:cSld>
+    <p:spTree>
+      <p:nvGrpSpPr>
+        <p:cNvPr id="1" name=""/>
+        <p:cNvGrpSpPr/>
+        <p:nvPr/>
+      </p:nvGrpSpPr>
+      <p:grpSpPr>
+        <a:xfrm>
+          <a:off x="0" y="0"/>
+          <a:ext cx="0" cy="0"/>
+          <a:chOff x="0" y="0"/>
+          <a:chExt cx="0" cy="0"/>
+        </a:xfrm>
+      </p:grpSpPr>
+      <p:pic>
+        <p:nvPicPr>
+          <p:cNvPr id="6" name="Picture 5">
+            <a:extLst>
+              <a:ext uri="{FF2B5EF4-FFF2-40B4-BE49-F238E27FC236}">
+                <a16:creationId xmlns:a16="http://schemas.microsoft.com/office/drawing/2014/main" id="{CB441A22-18D6-4F9A-A321-680798C5965C}"/>
+              </a:ext>
+            </a:extLst>
+          </p:cNvPr>
+          <p:cNvPicPr>
+            <a:picLocks noChangeAspect="1"/>
+          </p:cNvPicPr>
+          <p:nvPr/>
+        </p:nvPicPr>
+        <p:blipFill>
+          <a:blip r:embed="rId2"/>
+          <a:stretch>
+            <a:fillRect/>
+          </a:stretch>
+        </p:blipFill>
+        <p:spPr>
+          <a:xfrm>
+            <a:off x="1017043" y="1658788"/>
+            <a:ext cx="11230096" cy="3869482"/>
+          </a:xfrm>
+          <a:prstGeom prst="rect">
+            <a:avLst/>
+          </a:prstGeom>
+        </p:spPr>
+      </p:pic>
+      <p:sp>
+        <p:nvSpPr>
+          <p:cNvPr id="2" name="Title 1">
+            <a:extLst>
+              <a:ext uri="{FF2B5EF4-FFF2-40B4-BE49-F238E27FC236}">
+                <a16:creationId xmlns:a16="http://schemas.microsoft.com/office/drawing/2014/main" id="{28EE2FDC-A3BB-4B4E-B8B0-C2B1BF07261A}"/>
+              </a:ext>
+            </a:extLst>
+          </p:cNvPr>
+          <p:cNvSpPr>
+            <a:spLocks noGrp="1"/>
+          </p:cNvSpPr>
+          <p:nvPr>
+            <p:ph type="title"/>
+          </p:nvPr>
+        </p:nvSpPr>
+        <p:spPr/>
+        <p:txBody>
+          <a:bodyPr/>
+          <a:lstStyle/>
+          <a:p>
+            <a:r>
+              <a:rPr lang="en-US" dirty="0"/>
+              <a:t>Exercise 4</a:t>
+            </a:r>
+          </a:p>
+        </p:txBody>
+      </p:sp>
+      <p:sp>
+        <p:nvSpPr>
+          <p:cNvPr id="5" name="Content Placeholder 4">
+            <a:extLst>
+              <a:ext uri="{FF2B5EF4-FFF2-40B4-BE49-F238E27FC236}">
+                <a16:creationId xmlns:a16="http://schemas.microsoft.com/office/drawing/2014/main" id="{84CCE329-81ED-40EE-974D-568691E4A576}"/>
+              </a:ext>
+            </a:extLst>
+          </p:cNvPr>
+          <p:cNvSpPr>
+            <a:spLocks noGrp="1"/>
+          </p:cNvSpPr>
+          <p:nvPr>
+            <p:ph idx="1"/>
+          </p:nvPr>
+        </p:nvSpPr>
+        <p:spPr/>
+        <p:txBody>
+          <a:bodyPr/>
+          <a:lstStyle/>
+          <a:p>
+            <a:r>
+              <a:rPr lang="en-US" dirty="0"/>
+              <a:t>Add second engine</a:t>
+            </a:r>
+          </a:p>
+          <a:p>
+            <a:r>
+              <a:rPr lang="en-US" dirty="0"/>
+              <a:t>Add UDP module</a:t>
+            </a:r>
+          </a:p>
+          <a:p>
+            <a:r>
+              <a:rPr lang="en-US" dirty="0"/>
+              <a:t>Configure UDP modules</a:t>
+            </a:r>
+          </a:p>
+          <a:p>
+            <a:r>
+              <a:rPr lang="en-US" dirty="0"/>
+              <a:t>Test</a:t>
+            </a:r>
+          </a:p>
+          <a:p>
+            <a:endParaRPr lang="en-US" dirty="0"/>
+          </a:p>
+        </p:txBody>
+      </p:sp>
+    </p:spTree>
+    <p:extLst>
+      <p:ext uri="{BB962C8B-B14F-4D97-AF65-F5344CB8AC3E}">
+        <p14:creationId xmlns:p14="http://schemas.microsoft.com/office/powerpoint/2010/main" val="2461100923"/>
+      </p:ext>
+    </p:extLst>
+  </p:cSld>
+  <p:clrMapOvr>
+    <a:masterClrMapping/>
+  </p:clrMapOvr>
+</p:sld>
+</file>
+
+<file path=ppt/slides/slide24.xml><?xml version="1.0" encoding="utf-8"?>
+<p:sld xmlns:a="http://schemas.openxmlformats.org/drawingml/2006/main" xmlns:r="http://schemas.openxmlformats.org/officeDocument/2006/relationships" xmlns:p="http://schemas.openxmlformats.org/presentationml/2006/main">
+  <p:cSld>
+    <p:spTree>
+      <p:nvGrpSpPr>
+        <p:cNvPr id="1" name=""/>
+        <p:cNvGrpSpPr/>
+        <p:nvPr/>
+      </p:nvGrpSpPr>
+      <p:grpSpPr>
+        <a:xfrm>
+          <a:off x="0" y="0"/>
+          <a:ext cx="0" cy="0"/>
+          <a:chOff x="0" y="0"/>
+          <a:chExt cx="0" cy="0"/>
+        </a:xfrm>
+      </p:grpSpPr>
+      <p:sp>
+        <p:nvSpPr>
+          <p:cNvPr id="2" name="Title 1">
+            <a:extLst>
+              <a:ext uri="{FF2B5EF4-FFF2-40B4-BE49-F238E27FC236}">
+                <a16:creationId xmlns:a16="http://schemas.microsoft.com/office/drawing/2014/main" id="{899A3CB7-10EE-4C09-BEEF-18D2CEF0113E}"/>
+              </a:ext>
+            </a:extLst>
+          </p:cNvPr>
+          <p:cNvSpPr>
+            <a:spLocks noGrp="1"/>
+          </p:cNvSpPr>
+          <p:nvPr>
+            <p:ph type="title"/>
+          </p:nvPr>
+        </p:nvSpPr>
+        <p:spPr/>
+        <p:txBody>
+          <a:bodyPr/>
+          <a:lstStyle/>
+          <a:p>
+            <a:r>
+              <a:rPr lang="en-US" dirty="0"/>
+              <a:t>Conclusion</a:t>
+            </a:r>
+          </a:p>
+        </p:txBody>
+      </p:sp>
+      <p:sp>
+        <p:nvSpPr>
+          <p:cNvPr id="3" name="Content Placeholder 2">
+            <a:extLst>
+              <a:ext uri="{FF2B5EF4-FFF2-40B4-BE49-F238E27FC236}">
+                <a16:creationId xmlns:a16="http://schemas.microsoft.com/office/drawing/2014/main" id="{6A4767EB-4F86-42AD-AE97-F7C0EC2E2A84}"/>
+              </a:ext>
+            </a:extLst>
+          </p:cNvPr>
+          <p:cNvSpPr>
+            <a:spLocks noGrp="1"/>
+          </p:cNvSpPr>
+          <p:nvPr>
+            <p:ph idx="1"/>
+          </p:nvPr>
+        </p:nvSpPr>
+        <p:spPr/>
+        <p:txBody>
+          <a:bodyPr/>
+          <a:lstStyle/>
+          <a:p>
+            <a:r>
+              <a:rPr lang="en-US" dirty="0"/>
+              <a:t>Before creating modules check available modules</a:t>
+            </a:r>
+          </a:p>
+          <a:p>
+            <a:r>
+              <a:rPr lang="en-US" dirty="0"/>
+              <a:t>Choose the right execution template</a:t>
+            </a:r>
+          </a:p>
+          <a:p>
+            <a:r>
+              <a:rPr lang="en-US" dirty="0"/>
+              <a:t>Create the configuration</a:t>
+            </a:r>
+          </a:p>
+          <a:p>
+            <a:r>
+              <a:rPr lang="en-US" dirty="0"/>
+              <a:t>Update include VIs</a:t>
+            </a:r>
+          </a:p>
+          <a:p>
+            <a:r>
+              <a:rPr lang="en-US" dirty="0"/>
+              <a:t>Deploy Configuration</a:t>
+            </a:r>
+          </a:p>
+          <a:p>
+            <a:endParaRPr lang="en-US" dirty="0"/>
+          </a:p>
+          <a:p>
+            <a:r>
+              <a:rPr lang="en-US" dirty="0"/>
+              <a:t>Most likely you will need at least 1 custom module most likely a static module and that is cover on the next session</a:t>
+            </a:r>
+          </a:p>
+          <a:p>
+            <a:endParaRPr lang="en-US" dirty="0"/>
+          </a:p>
+          <a:p>
+            <a:endParaRPr lang="en-US" dirty="0"/>
+          </a:p>
+        </p:txBody>
+      </p:sp>
+    </p:spTree>
+    <p:extLst>
+      <p:ext uri="{BB962C8B-B14F-4D97-AF65-F5344CB8AC3E}">
+        <p14:creationId xmlns:p14="http://schemas.microsoft.com/office/powerpoint/2010/main" val="869522824"/>
+      </p:ext>
+    </p:extLst>
+  </p:cSld>
+  <p:clrMapOvr>
+    <a:masterClrMapping/>
+  </p:clrMapOvr>
+</p:sld>
+</file>
+
 <file path=ppt/slides/slide3.xml><?xml version="1.0" encoding="utf-8"?>
 <p:sld xmlns:a="http://schemas.openxmlformats.org/drawingml/2006/main" xmlns:r="http://schemas.openxmlformats.org/officeDocument/2006/relationships" xmlns:p="http://schemas.openxmlformats.org/presentationml/2006/main" show="0">
   <p:cSld>
@@ -8989,7 +9542,7 @@
 </file>
 
 <file path=ppt/slides/slide4.xml><?xml version="1.0" encoding="utf-8"?>
-<p:sld xmlns:a="http://schemas.openxmlformats.org/drawingml/2006/main" xmlns:r="http://schemas.openxmlformats.org/officeDocument/2006/relationships" xmlns:p="http://schemas.openxmlformats.org/presentationml/2006/main">
+<p:sld xmlns:a="http://schemas.openxmlformats.org/drawingml/2006/main" xmlns:r="http://schemas.openxmlformats.org/officeDocument/2006/relationships" xmlns:p="http://schemas.openxmlformats.org/presentationml/2006/main" show="0">
   <p:cSld>
     <p:spTree>
       <p:nvGrpSpPr>
@@ -9028,7 +9581,7 @@
           <a:p>
             <a:r>
               <a:rPr lang="en-US" dirty="0"/>
-              <a:t>Exercise project With Hardware. </a:t>
+              <a:t>Exercise Project With Hardware </a:t>
             </a:r>
           </a:p>
         </p:txBody>
@@ -9046,14 +9599,10 @@
             <a:spLocks noGrp="1"/>
           </p:cNvSpPr>
           <p:nvPr>
-            <p:ph idx="1"/>
-          </p:nvPr>
-        </p:nvSpPr>
-        <p:spPr>
-          <a:xfrm>
-            <a:off x="605367" y="1088571"/>
-            <a:ext cx="3929311" cy="4826603"/>
-          </a:xfrm>
+            <p:ph sz="half" idx="1"/>
+          </p:nvPr>
+        </p:nvSpPr>
+        <p:spPr>
           <a:ln>
             <a:solidFill>
               <a:schemeClr val="bg1"/>
@@ -9080,31 +9629,13 @@
           <a:p>
             <a:r>
               <a:rPr lang="en-US" dirty="0"/>
-              <a:t>2 Engines</a:t>
-            </a:r>
-          </a:p>
-          <a:p>
-            <a:r>
-              <a:rPr lang="en-US" dirty="0"/>
-              <a:t>UDP for E3E</a:t>
-            </a:r>
-          </a:p>
-          <a:p>
-            <a:r>
-              <a:rPr lang="en-US" dirty="0"/>
-              <a:t>Temperature control</a:t>
+              <a:t>Temperature control Logic PID</a:t>
             </a:r>
           </a:p>
           <a:p>
             <a:r>
               <a:rPr lang="en-US" dirty="0"/>
               <a:t>Acquire Data Scan Engine</a:t>
-            </a:r>
-          </a:p>
-          <a:p>
-            <a:r>
-              <a:rPr lang="en-US" dirty="0"/>
-              <a:t>PID Control</a:t>
             </a:r>
           </a:p>
           <a:p>
@@ -9155,7 +9686,7 @@
         </p:blipFill>
         <p:spPr>
           <a:xfrm>
-            <a:off x="4534678" y="1631296"/>
+            <a:off x="5367867" y="1612823"/>
             <a:ext cx="6210300" cy="3057525"/>
           </a:xfrm>
           <a:prstGeom prst="rect">
@@ -9234,7 +9765,7 @@
             <a:spLocks noGrp="1"/>
           </p:cNvSpPr>
           <p:nvPr>
-            <p:ph idx="1"/>
+            <p:ph sz="half" idx="1"/>
           </p:nvPr>
         </p:nvSpPr>
         <p:spPr/>
@@ -9244,25 +9775,7 @@
           <a:p>
             <a:r>
               <a:rPr lang="en-US" dirty="0"/>
-              <a:t>2 Engines</a:t>
-            </a:r>
-          </a:p>
-          <a:p>
-            <a:r>
-              <a:rPr lang="en-US" dirty="0"/>
-              <a:t>UDP for E3E</a:t>
-            </a:r>
-          </a:p>
-          <a:p>
-            <a:r>
-              <a:rPr lang="en-US" dirty="0"/>
-              <a:t>Temperature control</a:t>
-            </a:r>
-          </a:p>
-          <a:p>
-            <a:r>
-              <a:rPr lang="en-US" dirty="0"/>
-              <a:t>Acquire Data Scan Engine</a:t>
+              <a:t>Temperature chamber simulation</a:t>
             </a:r>
           </a:p>
           <a:p>
@@ -9310,8 +9823,8 @@
         </p:blipFill>
         <p:spPr>
           <a:xfrm>
-            <a:off x="3927380" y="2393296"/>
-            <a:ext cx="8014225" cy="2761410"/>
+            <a:off x="4922199" y="1489363"/>
+            <a:ext cx="7121005" cy="2453639"/>
           </a:xfrm>
           <a:prstGeom prst="rect">
             <a:avLst/>

</xml_diff>

<commit_message>
Moved Exercise 1 to MarkDown. Updated Slides on CHapter 5 to point to the right Excercises.
</commit_message>
<xml_diff>
--- a/Trunk/Getting Started Material/DCAF Training/5 Module Reuse.pptx
+++ b/Trunk/Getting Started Material/DCAF Training/5 Module Reuse.pptx
@@ -5,7 +5,7 @@
     <p:sldMasterId id="2147483660" r:id="rId1"/>
   </p:sldMasterIdLst>
   <p:notesMasterIdLst>
-    <p:notesMasterId r:id="rId20"/>
+    <p:notesMasterId r:id="rId21"/>
   </p:notesMasterIdLst>
   <p:sldIdLst>
     <p:sldId id="259" r:id="rId2"/>
@@ -22,10 +22,11 @@
     <p:sldId id="334" r:id="rId13"/>
     <p:sldId id="335" r:id="rId14"/>
     <p:sldId id="336" r:id="rId15"/>
-    <p:sldId id="332" r:id="rId16"/>
-    <p:sldId id="337" r:id="rId17"/>
-    <p:sldId id="338" r:id="rId18"/>
-    <p:sldId id="339" r:id="rId19"/>
+    <p:sldId id="340" r:id="rId16"/>
+    <p:sldId id="332" r:id="rId17"/>
+    <p:sldId id="337" r:id="rId18"/>
+    <p:sldId id="338" r:id="rId19"/>
+    <p:sldId id="339" r:id="rId20"/>
   </p:sldIdLst>
   <p:sldSz cx="12192000" cy="6858000"/>
   <p:notesSz cx="6858000" cy="9144000"/>
@@ -214,7 +215,7 @@
           <a:p>
             <a:fld id="{6AC401AC-D3C2-4B65-ADB1-466FE56A765F}" type="datetimeFigureOut">
               <a:rPr lang="en-US" smtClean="0"/>
-              <a:t>2018-07-10</a:t>
+              <a:t>8/27/2018</a:t>
             </a:fld>
             <a:endParaRPr lang="en-US"/>
           </a:p>
@@ -3906,7 +3907,7 @@
           <a:p>
             <a:fld id="{D1DEFE4E-FB55-4E12-ABF7-80229555E042}" type="datetimeFigureOut">
               <a:rPr lang="en-US" smtClean="0"/>
-              <a:t>2018-07-10</a:t>
+              <a:t>8/27/2018</a:t>
             </a:fld>
             <a:endParaRPr lang="en-US"/>
           </a:p>
@@ -4897,7 +4898,7 @@
           <a:p>
             <a:fld id="{D1DEFE4E-FB55-4E12-ABF7-80229555E042}" type="datetimeFigureOut">
               <a:rPr lang="en-US" smtClean="0"/>
-              <a:t>2018-07-10</a:t>
+              <a:t>8/27/2018</a:t>
             </a:fld>
             <a:endParaRPr lang="en-US"/>
           </a:p>
@@ -7741,6 +7742,12 @@
               <a:t>Exercise 1</a:t>
             </a:r>
           </a:p>
+          <a:p>
+            <a:r>
+              <a:rPr lang="en-US" dirty="0"/>
+              <a:t>Hands On Exercise 1 Part A</a:t>
+            </a:r>
+          </a:p>
         </p:txBody>
       </p:sp>
     </p:spTree>
@@ -8069,6 +8076,12 @@
               <a:t>Exercise 2</a:t>
             </a:r>
           </a:p>
+          <a:p>
+            <a:r>
+              <a:rPr lang="en-US" dirty="0"/>
+              <a:t>Hands On Exercise 1 Part B</a:t>
+            </a:r>
+          </a:p>
         </p:txBody>
       </p:sp>
     </p:spTree>
@@ -8103,82 +8116,42 @@
       </p:grpSpPr>
       <p:sp>
         <p:nvSpPr>
-          <p:cNvPr id="2" name="Title 1"/>
-          <p:cNvSpPr>
-            <a:spLocks noGrp="1"/>
-          </p:cNvSpPr>
-          <p:nvPr>
-            <p:ph type="title"/>
-          </p:nvPr>
-        </p:nvSpPr>
-        <p:spPr/>
-        <p:txBody>
-          <a:bodyPr/>
-          <a:lstStyle/>
-          <a:p>
-            <a:r>
-              <a:rPr lang="en-US" dirty="0"/>
-              <a:t> What type of module do I need</a:t>
-            </a:r>
-          </a:p>
-        </p:txBody>
-      </p:sp>
-      <p:sp>
-        <p:nvSpPr>
-          <p:cNvPr id="3" name="Content Placeholder 2"/>
-          <p:cNvSpPr>
-            <a:spLocks noGrp="1"/>
-          </p:cNvSpPr>
-          <p:nvPr>
-            <p:ph sz="half" idx="1"/>
-          </p:nvPr>
-        </p:nvSpPr>
-        <p:spPr/>
-        <p:txBody>
-          <a:bodyPr/>
-          <a:lstStyle/>
-          <a:p>
-            <a:endParaRPr lang="en-US" dirty="0"/>
-          </a:p>
-          <a:p>
-            <a:endParaRPr lang="en-US" dirty="0"/>
-          </a:p>
-        </p:txBody>
-      </p:sp>
-      <p:pic>
-        <p:nvPicPr>
-          <p:cNvPr id="6" name="Picture 5">
+          <p:cNvPr id="4" name="Text Placeholder 3">
             <a:extLst>
               <a:ext uri="{FF2B5EF4-FFF2-40B4-BE49-F238E27FC236}">
-                <a16:creationId xmlns:a16="http://schemas.microsoft.com/office/drawing/2014/main" id="{020D13B5-AA7C-40F4-804E-4430A96880F4}"/>
+                <a16:creationId xmlns:a16="http://schemas.microsoft.com/office/drawing/2014/main" id="{8E74E8A2-5E75-4DD9-82DB-05972278D9D6}"/>
               </a:ext>
             </a:extLst>
           </p:cNvPr>
-          <p:cNvPicPr>
-            <a:picLocks noChangeAspect="1"/>
-          </p:cNvPicPr>
-          <p:nvPr/>
-        </p:nvPicPr>
-        <p:blipFill>
-          <a:blip r:embed="rId2"/>
-          <a:stretch>
-            <a:fillRect/>
-          </a:stretch>
-        </p:blipFill>
-        <p:spPr>
-          <a:xfrm>
-            <a:off x="1113453" y="1158632"/>
-            <a:ext cx="9558780" cy="4996462"/>
-          </a:xfrm>
-          <a:prstGeom prst="rect">
-            <a:avLst/>
-          </a:prstGeom>
-        </p:spPr>
-      </p:pic>
+          <p:cNvSpPr>
+            <a:spLocks noGrp="1"/>
+          </p:cNvSpPr>
+          <p:nvPr>
+            <p:ph type="body" sz="quarter" idx="10"/>
+          </p:nvPr>
+        </p:nvSpPr>
+        <p:spPr/>
+        <p:txBody>
+          <a:bodyPr/>
+          <a:lstStyle/>
+          <a:p>
+            <a:r>
+              <a:rPr lang="en-US" dirty="0"/>
+              <a:t>Exercise 3 (optional)</a:t>
+            </a:r>
+          </a:p>
+          <a:p>
+            <a:r>
+              <a:rPr lang="en-US" dirty="0"/>
+              <a:t>Hands On Exercise 1 Part C</a:t>
+            </a:r>
+          </a:p>
+        </p:txBody>
+      </p:sp>
     </p:spTree>
     <p:extLst>
       <p:ext uri="{BB962C8B-B14F-4D97-AF65-F5344CB8AC3E}">
-        <p14:creationId xmlns:p14="http://schemas.microsoft.com/office/powerpoint/2010/main" val="1652348957"/>
+        <p14:creationId xmlns:p14="http://schemas.microsoft.com/office/powerpoint/2010/main" val="4270175823"/>
       </p:ext>
     </p:extLst>
   </p:cSld>
@@ -8207,81 +8180,61 @@
       </p:grpSpPr>
       <p:sp>
         <p:nvSpPr>
-          <p:cNvPr id="2" name="Title 1">
+          <p:cNvPr id="2" name="Title 1"/>
+          <p:cNvSpPr>
+            <a:spLocks noGrp="1"/>
+          </p:cNvSpPr>
+          <p:nvPr>
+            <p:ph type="title"/>
+          </p:nvPr>
+        </p:nvSpPr>
+        <p:spPr/>
+        <p:txBody>
+          <a:bodyPr/>
+          <a:lstStyle/>
+          <a:p>
+            <a:r>
+              <a:rPr lang="en-US" dirty="0"/>
+              <a:t> What type of module do I need</a:t>
+            </a:r>
+          </a:p>
+        </p:txBody>
+      </p:sp>
+      <p:sp>
+        <p:nvSpPr>
+          <p:cNvPr id="3" name="Content Placeholder 2"/>
+          <p:cNvSpPr>
+            <a:spLocks noGrp="1"/>
+          </p:cNvSpPr>
+          <p:nvPr>
+            <p:ph sz="half" idx="1"/>
+          </p:nvPr>
+        </p:nvSpPr>
+        <p:spPr/>
+        <p:txBody>
+          <a:bodyPr/>
+          <a:lstStyle/>
+          <a:p>
+            <a:endParaRPr lang="en-US" dirty="0"/>
+          </a:p>
+          <a:p>
+            <a:endParaRPr lang="en-US" dirty="0"/>
+          </a:p>
+        </p:txBody>
+      </p:sp>
+      <p:pic>
+        <p:nvPicPr>
+          <p:cNvPr id="6" name="Picture 5">
             <a:extLst>
               <a:ext uri="{FF2B5EF4-FFF2-40B4-BE49-F238E27FC236}">
-                <a16:creationId xmlns:a16="http://schemas.microsoft.com/office/drawing/2014/main" id="{E2FFB8DF-E381-441C-AB33-0AB0CD6CDD29}"/>
-              </a:ext>
-            </a:extLst>
-          </p:cNvPr>
-          <p:cNvSpPr>
-            <a:spLocks noGrp="1"/>
-          </p:cNvSpPr>
-          <p:nvPr>
-            <p:ph type="title"/>
-          </p:nvPr>
-        </p:nvSpPr>
-        <p:spPr/>
-        <p:txBody>
-          <a:bodyPr/>
-          <a:lstStyle/>
-          <a:p>
-            <a:r>
-              <a:rPr lang="en-US" dirty="0"/>
-              <a:t>Script Includes</a:t>
-            </a:r>
-          </a:p>
-        </p:txBody>
-      </p:sp>
-      <p:sp>
-        <p:nvSpPr>
-          <p:cNvPr id="3" name="Content Placeholder 2">
-            <a:extLst>
-              <a:ext uri="{FF2B5EF4-FFF2-40B4-BE49-F238E27FC236}">
-                <a16:creationId xmlns:a16="http://schemas.microsoft.com/office/drawing/2014/main" id="{5DD0D945-60E8-43F2-BE43-384B4E3DCB56}"/>
-              </a:ext>
-            </a:extLst>
-          </p:cNvPr>
-          <p:cNvSpPr>
-            <a:spLocks noGrp="1"/>
-          </p:cNvSpPr>
-          <p:nvPr>
-            <p:ph sz="half" idx="1"/>
-          </p:nvPr>
-        </p:nvSpPr>
-        <p:spPr/>
-        <p:txBody>
-          <a:bodyPr/>
-          <a:lstStyle/>
-          <a:p>
-            <a:r>
-              <a:rPr lang="en-US" dirty="0"/>
-              <a:t>You should run this every time you add new modules to the configuration</a:t>
-            </a:r>
-          </a:p>
-          <a:p>
-            <a:r>
-              <a:rPr lang="en-US" dirty="0"/>
-              <a:t>It updates the includes VI</a:t>
-            </a:r>
-          </a:p>
-        </p:txBody>
-      </p:sp>
-      <p:pic>
-        <p:nvPicPr>
-          <p:cNvPr id="6" name="Picture Placeholder 5">
-            <a:extLst>
-              <a:ext uri="{FF2B5EF4-FFF2-40B4-BE49-F238E27FC236}">
-                <a16:creationId xmlns:a16="http://schemas.microsoft.com/office/drawing/2014/main" id="{03268D42-02C0-4EB4-93DB-F2491F854F54}"/>
+                <a16:creationId xmlns:a16="http://schemas.microsoft.com/office/drawing/2014/main" id="{020D13B5-AA7C-40F4-804E-4430A96880F4}"/>
               </a:ext>
             </a:extLst>
           </p:cNvPr>
           <p:cNvPicPr>
-            <a:picLocks noGrp="1" noChangeAspect="1"/>
+            <a:picLocks noChangeAspect="1"/>
           </p:cNvPicPr>
-          <p:nvPr>
-            <p:ph sz="half" idx="2"/>
-          </p:nvPr>
+          <p:nvPr/>
         </p:nvPicPr>
         <p:blipFill>
           <a:blip r:embed="rId2"/>
@@ -8291,8 +8244,8 @@
         </p:blipFill>
         <p:spPr>
           <a:xfrm>
-            <a:off x="6851330" y="974725"/>
-            <a:ext cx="4082102" cy="5202238"/>
+            <a:off x="1113453" y="1158632"/>
+            <a:ext cx="9558780" cy="4996462"/>
           </a:xfrm>
           <a:prstGeom prst="rect">
             <a:avLst/>
@@ -8302,7 +8255,7 @@
     </p:spTree>
     <p:extLst>
       <p:ext uri="{BB962C8B-B14F-4D97-AF65-F5344CB8AC3E}">
-        <p14:creationId xmlns:p14="http://schemas.microsoft.com/office/powerpoint/2010/main" val="3075195045"/>
+        <p14:creationId xmlns:p14="http://schemas.microsoft.com/office/powerpoint/2010/main" val="1652348957"/>
       </p:ext>
     </p:extLst>
   </p:cSld>
@@ -8334,6 +8287,130 @@
           <p:cNvPr id="2" name="Title 1">
             <a:extLst>
               <a:ext uri="{FF2B5EF4-FFF2-40B4-BE49-F238E27FC236}">
+                <a16:creationId xmlns:a16="http://schemas.microsoft.com/office/drawing/2014/main" id="{E2FFB8DF-E381-441C-AB33-0AB0CD6CDD29}"/>
+              </a:ext>
+            </a:extLst>
+          </p:cNvPr>
+          <p:cNvSpPr>
+            <a:spLocks noGrp="1"/>
+          </p:cNvSpPr>
+          <p:nvPr>
+            <p:ph type="title"/>
+          </p:nvPr>
+        </p:nvSpPr>
+        <p:spPr/>
+        <p:txBody>
+          <a:bodyPr/>
+          <a:lstStyle/>
+          <a:p>
+            <a:r>
+              <a:rPr lang="en-US" dirty="0"/>
+              <a:t>Script Includes</a:t>
+            </a:r>
+          </a:p>
+        </p:txBody>
+      </p:sp>
+      <p:sp>
+        <p:nvSpPr>
+          <p:cNvPr id="3" name="Content Placeholder 2">
+            <a:extLst>
+              <a:ext uri="{FF2B5EF4-FFF2-40B4-BE49-F238E27FC236}">
+                <a16:creationId xmlns:a16="http://schemas.microsoft.com/office/drawing/2014/main" id="{5DD0D945-60E8-43F2-BE43-384B4E3DCB56}"/>
+              </a:ext>
+            </a:extLst>
+          </p:cNvPr>
+          <p:cNvSpPr>
+            <a:spLocks noGrp="1"/>
+          </p:cNvSpPr>
+          <p:nvPr>
+            <p:ph sz="half" idx="1"/>
+          </p:nvPr>
+        </p:nvSpPr>
+        <p:spPr/>
+        <p:txBody>
+          <a:bodyPr/>
+          <a:lstStyle/>
+          <a:p>
+            <a:r>
+              <a:rPr lang="en-US" dirty="0"/>
+              <a:t>You should run this every time you add new modules to the configuration</a:t>
+            </a:r>
+          </a:p>
+          <a:p>
+            <a:r>
+              <a:rPr lang="en-US" dirty="0"/>
+              <a:t>It updates the includes VI</a:t>
+            </a:r>
+          </a:p>
+        </p:txBody>
+      </p:sp>
+      <p:pic>
+        <p:nvPicPr>
+          <p:cNvPr id="6" name="Picture Placeholder 5">
+            <a:extLst>
+              <a:ext uri="{FF2B5EF4-FFF2-40B4-BE49-F238E27FC236}">
+                <a16:creationId xmlns:a16="http://schemas.microsoft.com/office/drawing/2014/main" id="{03268D42-02C0-4EB4-93DB-F2491F854F54}"/>
+              </a:ext>
+            </a:extLst>
+          </p:cNvPr>
+          <p:cNvPicPr>
+            <a:picLocks noGrp="1" noChangeAspect="1"/>
+          </p:cNvPicPr>
+          <p:nvPr>
+            <p:ph sz="half" idx="2"/>
+          </p:nvPr>
+        </p:nvPicPr>
+        <p:blipFill>
+          <a:blip r:embed="rId2"/>
+          <a:stretch>
+            <a:fillRect/>
+          </a:stretch>
+        </p:blipFill>
+        <p:spPr>
+          <a:xfrm>
+            <a:off x="6851330" y="974725"/>
+            <a:ext cx="4082102" cy="5202238"/>
+          </a:xfrm>
+          <a:prstGeom prst="rect">
+            <a:avLst/>
+          </a:prstGeom>
+        </p:spPr>
+      </p:pic>
+    </p:spTree>
+    <p:extLst>
+      <p:ext uri="{BB962C8B-B14F-4D97-AF65-F5344CB8AC3E}">
+        <p14:creationId xmlns:p14="http://schemas.microsoft.com/office/powerpoint/2010/main" val="3075195045"/>
+      </p:ext>
+    </p:extLst>
+  </p:cSld>
+  <p:clrMapOvr>
+    <a:masterClrMapping/>
+  </p:clrMapOvr>
+</p:sld>
+</file>
+
+<file path=ppt/slides/slide18.xml><?xml version="1.0" encoding="utf-8"?>
+<p:sld xmlns:a="http://schemas.openxmlformats.org/drawingml/2006/main" xmlns:r="http://schemas.openxmlformats.org/officeDocument/2006/relationships" xmlns:p="http://schemas.openxmlformats.org/presentationml/2006/main">
+  <p:cSld>
+    <p:spTree>
+      <p:nvGrpSpPr>
+        <p:cNvPr id="1" name=""/>
+        <p:cNvGrpSpPr/>
+        <p:nvPr/>
+      </p:nvGrpSpPr>
+      <p:grpSpPr>
+        <a:xfrm>
+          <a:off x="0" y="0"/>
+          <a:ext cx="0" cy="0"/>
+          <a:chOff x="0" y="0"/>
+          <a:chExt cx="0" cy="0"/>
+        </a:xfrm>
+      </p:grpSpPr>
+      <p:sp>
+        <p:nvSpPr>
+          <p:cNvPr id="2" name="Title 1">
+            <a:extLst>
+              <a:ext uri="{FF2B5EF4-FFF2-40B4-BE49-F238E27FC236}">
                 <a16:creationId xmlns:a16="http://schemas.microsoft.com/office/drawing/2014/main" id="{81313DE9-2E81-41C4-918F-86875267B812}"/>
               </a:ext>
             </a:extLst>
@@ -8402,7 +8479,7 @@
 </p:sld>
 </file>
 
-<file path=ppt/slides/slide18.xml><?xml version="1.0" encoding="utf-8"?>
+<file path=ppt/slides/slide19.xml><?xml version="1.0" encoding="utf-8"?>
 <p:sld xmlns:a="http://schemas.openxmlformats.org/drawingml/2006/main" xmlns:r="http://schemas.openxmlformats.org/officeDocument/2006/relationships" xmlns:p="http://schemas.openxmlformats.org/presentationml/2006/main">
   <p:cSld>
     <p:spTree>

</xml_diff>